<commit_message>
Updated ppt is pushed
</commit_message>
<xml_diff>
--- a/E-commerce Cart System.pptx
+++ b/E-commerce Cart System.pptx
@@ -5,25 +5,29 @@
     <p:sldMasterId id="2147483669" r:id="rId4"/>
   </p:sldMasterIdLst>
   <p:notesMasterIdLst>
-    <p:notesMasterId r:id="rId18"/>
+    <p:notesMasterId r:id="rId22"/>
   </p:notesMasterIdLst>
   <p:handoutMasterIdLst>
-    <p:handoutMasterId r:id="rId19"/>
+    <p:handoutMasterId r:id="rId23"/>
   </p:handoutMasterIdLst>
   <p:sldIdLst>
     <p:sldId id="256" r:id="rId5"/>
     <p:sldId id="257" r:id="rId6"/>
     <p:sldId id="258" r:id="rId7"/>
-    <p:sldId id="268" r:id="rId8"/>
-    <p:sldId id="259" r:id="rId9"/>
-    <p:sldId id="260" r:id="rId10"/>
-    <p:sldId id="261" r:id="rId11"/>
-    <p:sldId id="262" r:id="rId12"/>
-    <p:sldId id="263" r:id="rId13"/>
-    <p:sldId id="264" r:id="rId14"/>
-    <p:sldId id="265" r:id="rId15"/>
-    <p:sldId id="266" r:id="rId16"/>
-    <p:sldId id="267" r:id="rId17"/>
+    <p:sldId id="259" r:id="rId8"/>
+    <p:sldId id="260" r:id="rId9"/>
+    <p:sldId id="261" r:id="rId10"/>
+    <p:sldId id="262" r:id="rId11"/>
+    <p:sldId id="263" r:id="rId12"/>
+    <p:sldId id="264" r:id="rId13"/>
+    <p:sldId id="265" r:id="rId14"/>
+    <p:sldId id="266" r:id="rId15"/>
+    <p:sldId id="267" r:id="rId16"/>
+    <p:sldId id="268" r:id="rId17"/>
+    <p:sldId id="269" r:id="rId18"/>
+    <p:sldId id="270" r:id="rId19"/>
+    <p:sldId id="271" r:id="rId20"/>
+    <p:sldId id="272" r:id="rId21"/>
   </p:sldIdLst>
   <p:sldSz cx="12192000" cy="6858000"/>
   <p:notesSz cx="6858000" cy="9144000"/>
@@ -130,7 +134,6 @@
             <p14:sldId id="256"/>
             <p14:sldId id="257"/>
             <p14:sldId id="258"/>
-            <p14:sldId id="268"/>
             <p14:sldId id="259"/>
             <p14:sldId id="260"/>
             <p14:sldId id="261"/>
@@ -140,6 +143,11 @@
             <p14:sldId id="265"/>
             <p14:sldId id="266"/>
             <p14:sldId id="267"/>
+            <p14:sldId id="268"/>
+            <p14:sldId id="269"/>
+            <p14:sldId id="270"/>
+            <p14:sldId id="271"/>
+            <p14:sldId id="272"/>
           </p14:sldIdLst>
         </p14:section>
       </p14:sectionLst>
@@ -181,7 +189,7 @@
           <p:cNvPr id="2" name="Header Placeholder 1">
             <a:extLst>
               <a:ext uri="{FF2B5EF4-FFF2-40B4-BE49-F238E27FC236}">
-                <a16:creationId xmlns="" xmlns:a16="http://schemas.microsoft.com/office/drawing/2014/main" id="{399B3372-74CF-4E21-A4D4-286B22AA5A6F}"/>
+                <a16:creationId xmlns:a16="http://schemas.microsoft.com/office/drawing/2014/main" xmlns="" id="{399B3372-74CF-4E21-A4D4-286B22AA5A6F}"/>
               </a:ext>
             </a:extLst>
           </p:cNvPr>
@@ -218,7 +226,7 @@
           <p:cNvPr id="3" name="Date Placeholder 2">
             <a:extLst>
               <a:ext uri="{FF2B5EF4-FFF2-40B4-BE49-F238E27FC236}">
-                <a16:creationId xmlns="" xmlns:a16="http://schemas.microsoft.com/office/drawing/2014/main" id="{063762BE-D43C-49F5-99A5-BF49C695927E}"/>
+                <a16:creationId xmlns:a16="http://schemas.microsoft.com/office/drawing/2014/main" xmlns="" id="{063762BE-D43C-49F5-99A5-BF49C695927E}"/>
               </a:ext>
             </a:extLst>
           </p:cNvPr>
@@ -248,7 +256,7 @@
           <a:p>
             <a:fld id="{2B85766F-5EC0-4797-B4D1-777FCB005B11}" type="datetimeFigureOut">
               <a:rPr lang="en-US" smtClean="0"/>
-              <a:t>12/22/2024</a:t>
+              <a:t>12/28/2024</a:t>
             </a:fld>
             <a:endParaRPr lang="en-US" dirty="0"/>
           </a:p>
@@ -259,7 +267,7 @@
           <p:cNvPr id="4" name="Footer Placeholder 3">
             <a:extLst>
               <a:ext uri="{FF2B5EF4-FFF2-40B4-BE49-F238E27FC236}">
-                <a16:creationId xmlns="" xmlns:a16="http://schemas.microsoft.com/office/drawing/2014/main" id="{1989E452-9BCA-4AF5-9A9C-233BF410EAA7}"/>
+                <a16:creationId xmlns:a16="http://schemas.microsoft.com/office/drawing/2014/main" xmlns="" id="{1989E452-9BCA-4AF5-9A9C-233BF410EAA7}"/>
               </a:ext>
             </a:extLst>
           </p:cNvPr>
@@ -296,7 +304,7 @@
           <p:cNvPr id="5" name="Slide Number Placeholder 4">
             <a:extLst>
               <a:ext uri="{FF2B5EF4-FFF2-40B4-BE49-F238E27FC236}">
-                <a16:creationId xmlns="" xmlns:a16="http://schemas.microsoft.com/office/drawing/2014/main" id="{36BF9F63-CE4F-44E2-A07D-7E654DE9F57B}"/>
+                <a16:creationId xmlns:a16="http://schemas.microsoft.com/office/drawing/2014/main" xmlns="" id="{36BF9F63-CE4F-44E2-A07D-7E654DE9F57B}"/>
               </a:ext>
             </a:extLst>
           </p:cNvPr>
@@ -425,7 +433,7 @@
           <a:p>
             <a:fld id="{B2B4B5EC-152C-4627-80C0-63B10D5574EF}" type="datetimeFigureOut">
               <a:rPr lang="en-US" smtClean="0"/>
-              <a:t>12/22/2024</a:t>
+              <a:t>12/28/2024</a:t>
             </a:fld>
             <a:endParaRPr lang="en-US" dirty="0"/>
           </a:p>
@@ -749,7 +757,7 @@
           <a:noFill/>
           <a:extLst>
             <a:ext uri="{909E8E84-426E-40dd-AFC4-6F175D3DCCD1}">
-              <a14:hiddenFill xmlns:a14="http://schemas.microsoft.com/office/drawing/2010/main" xmlns="">
+              <a14:hiddenFill xmlns="" xmlns:a14="http://schemas.microsoft.com/office/drawing/2010/main">
                 <a:solidFill>
                   <a:srgbClr val="FFFFFF"/>
                 </a:solidFill>
@@ -808,7 +816,7 @@
             </a:ln>
             <a:extLst>
               <a:ext uri="{91240B29-F687-4f45-9708-019B960494DF}">
-                <a14:hiddenLine xmlns:a14="http://schemas.microsoft.com/office/drawing/2010/main" xmlns="" w="9525">
+                <a14:hiddenLine xmlns="" xmlns:a14="http://schemas.microsoft.com/office/drawing/2010/main" w="9525">
                   <a:solidFill>
                     <a:srgbClr val="000000"/>
                   </a:solidFill>
@@ -898,7 +906,7 @@
             </a:ln>
             <a:extLst>
               <a:ext uri="{91240B29-F687-4f45-9708-019B960494DF}">
-                <a14:hiddenLine xmlns:a14="http://schemas.microsoft.com/office/drawing/2010/main" xmlns="" w="9525">
+                <a14:hiddenLine xmlns="" xmlns:a14="http://schemas.microsoft.com/office/drawing/2010/main" w="9525">
                   <a:solidFill>
                     <a:srgbClr val="000000"/>
                   </a:solidFill>
@@ -988,7 +996,7 @@
             </a:ln>
             <a:extLst>
               <a:ext uri="{91240B29-F687-4f45-9708-019B960494DF}">
-                <a14:hiddenLine xmlns:a14="http://schemas.microsoft.com/office/drawing/2010/main" xmlns="" w="9525">
+                <a14:hiddenLine xmlns="" xmlns:a14="http://schemas.microsoft.com/office/drawing/2010/main" w="9525">
                   <a:solidFill>
                     <a:srgbClr val="000000"/>
                   </a:solidFill>
@@ -1022,7 +1030,7 @@
             </a:ln>
             <a:extLst>
               <a:ext uri="{91240B29-F687-4f45-9708-019B960494DF}">
-                <a14:hiddenLine xmlns:a14="http://schemas.microsoft.com/office/drawing/2010/main" xmlns="" w="9525">
+                <a14:hiddenLine xmlns="" xmlns:a14="http://schemas.microsoft.com/office/drawing/2010/main" w="9525">
                   <a:solidFill>
                     <a:srgbClr val="000000"/>
                   </a:solidFill>
@@ -1112,7 +1120,7 @@
             </a:ln>
             <a:extLst>
               <a:ext uri="{91240B29-F687-4f45-9708-019B960494DF}">
-                <a14:hiddenLine xmlns:a14="http://schemas.microsoft.com/office/drawing/2010/main" xmlns="" w="9525">
+                <a14:hiddenLine xmlns="" xmlns:a14="http://schemas.microsoft.com/office/drawing/2010/main" w="9525">
                   <a:solidFill>
                     <a:srgbClr val="000000"/>
                   </a:solidFill>
@@ -1174,7 +1182,7 @@
             </a:ln>
             <a:extLst>
               <a:ext uri="{91240B29-F687-4f45-9708-019B960494DF}">
-                <a14:hiddenLine xmlns:a14="http://schemas.microsoft.com/office/drawing/2010/main" xmlns="" w="9525">
+                <a14:hiddenLine xmlns="" xmlns:a14="http://schemas.microsoft.com/office/drawing/2010/main" w="9525">
                   <a:solidFill>
                     <a:srgbClr val="000000"/>
                   </a:solidFill>
@@ -1236,7 +1244,7 @@
             </a:ln>
             <a:extLst>
               <a:ext uri="{91240B29-F687-4f45-9708-019B960494DF}">
-                <a14:hiddenLine xmlns:a14="http://schemas.microsoft.com/office/drawing/2010/main" xmlns="" w="9525">
+                <a14:hiddenLine xmlns="" xmlns:a14="http://schemas.microsoft.com/office/drawing/2010/main" w="9525">
                   <a:solidFill>
                     <a:srgbClr val="000000"/>
                   </a:solidFill>
@@ -1326,7 +1334,7 @@
             </a:ln>
             <a:extLst>
               <a:ext uri="{91240B29-F687-4f45-9708-019B960494DF}">
-                <a14:hiddenLine xmlns:a14="http://schemas.microsoft.com/office/drawing/2010/main" xmlns="" w="9525">
+                <a14:hiddenLine xmlns="" xmlns:a14="http://schemas.microsoft.com/office/drawing/2010/main" w="9525">
                   <a:solidFill>
                     <a:srgbClr val="000000"/>
                   </a:solidFill>
@@ -1388,7 +1396,7 @@
             </a:ln>
             <a:extLst>
               <a:ext uri="{91240B29-F687-4f45-9708-019B960494DF}">
-                <a14:hiddenLine xmlns:a14="http://schemas.microsoft.com/office/drawing/2010/main" xmlns="" w="9525">
+                <a14:hiddenLine xmlns="" xmlns:a14="http://schemas.microsoft.com/office/drawing/2010/main" w="9525">
                   <a:solidFill>
                     <a:srgbClr val="000000"/>
                   </a:solidFill>
@@ -1450,7 +1458,7 @@
             </a:ln>
             <a:extLst>
               <a:ext uri="{91240B29-F687-4f45-9708-019B960494DF}">
-                <a14:hiddenLine xmlns:a14="http://schemas.microsoft.com/office/drawing/2010/main" xmlns="" w="9525">
+                <a14:hiddenLine xmlns="" xmlns:a14="http://schemas.microsoft.com/office/drawing/2010/main" w="9525">
                   <a:solidFill>
                     <a:srgbClr val="000000"/>
                   </a:solidFill>
@@ -1540,7 +1548,7 @@
             </a:ln>
             <a:extLst>
               <a:ext uri="{91240B29-F687-4f45-9708-019B960494DF}">
-                <a14:hiddenLine xmlns:a14="http://schemas.microsoft.com/office/drawing/2010/main" xmlns="" w="9525">
+                <a14:hiddenLine xmlns="" xmlns:a14="http://schemas.microsoft.com/office/drawing/2010/main" w="9525">
                   <a:solidFill>
                     <a:srgbClr val="000000"/>
                   </a:solidFill>
@@ -1630,7 +1638,7 @@
             </a:ln>
             <a:extLst>
               <a:ext uri="{91240B29-F687-4f45-9708-019B960494DF}">
-                <a14:hiddenLine xmlns:a14="http://schemas.microsoft.com/office/drawing/2010/main" xmlns="" w="9525">
+                <a14:hiddenLine xmlns="" xmlns:a14="http://schemas.microsoft.com/office/drawing/2010/main" w="9525">
                   <a:solidFill>
                     <a:srgbClr val="000000"/>
                   </a:solidFill>
@@ -1692,7 +1700,7 @@
             </a:ln>
             <a:extLst>
               <a:ext uri="{91240B29-F687-4f45-9708-019B960494DF}">
-                <a14:hiddenLine xmlns:a14="http://schemas.microsoft.com/office/drawing/2010/main" xmlns="" w="9525">
+                <a14:hiddenLine xmlns="" xmlns:a14="http://schemas.microsoft.com/office/drawing/2010/main" w="9525">
                   <a:solidFill>
                     <a:srgbClr val="000000"/>
                   </a:solidFill>
@@ -1802,7 +1810,7 @@
             </a:ln>
             <a:extLst>
               <a:ext uri="{91240B29-F687-4f45-9708-019B960494DF}">
-                <a14:hiddenLine xmlns:a14="http://schemas.microsoft.com/office/drawing/2010/main" xmlns="" w="9525">
+                <a14:hiddenLine xmlns="" xmlns:a14="http://schemas.microsoft.com/office/drawing/2010/main" w="9525">
                   <a:solidFill>
                     <a:srgbClr val="000000"/>
                   </a:solidFill>
@@ -1864,7 +1872,7 @@
             </a:ln>
             <a:extLst>
               <a:ext uri="{91240B29-F687-4f45-9708-019B960494DF}">
-                <a14:hiddenLine xmlns:a14="http://schemas.microsoft.com/office/drawing/2010/main" xmlns="" w="9525">
+                <a14:hiddenLine xmlns="" xmlns:a14="http://schemas.microsoft.com/office/drawing/2010/main" w="9525">
                   <a:solidFill>
                     <a:srgbClr val="000000"/>
                   </a:solidFill>
@@ -1954,7 +1962,7 @@
             </a:ln>
             <a:extLst>
               <a:ext uri="{91240B29-F687-4f45-9708-019B960494DF}">
-                <a14:hiddenLine xmlns:a14="http://schemas.microsoft.com/office/drawing/2010/main" xmlns="" w="9525">
+                <a14:hiddenLine xmlns="" xmlns:a14="http://schemas.microsoft.com/office/drawing/2010/main" w="9525">
                   <a:solidFill>
                     <a:srgbClr val="000000"/>
                   </a:solidFill>
@@ -2044,7 +2052,7 @@
             </a:ln>
             <a:extLst>
               <a:ext uri="{91240B29-F687-4f45-9708-019B960494DF}">
-                <a14:hiddenLine xmlns:a14="http://schemas.microsoft.com/office/drawing/2010/main" xmlns="" w="9525">
+                <a14:hiddenLine xmlns="" xmlns:a14="http://schemas.microsoft.com/office/drawing/2010/main" w="9525">
                   <a:solidFill>
                     <a:srgbClr val="000000"/>
                   </a:solidFill>
@@ -2106,7 +2114,7 @@
             </a:ln>
             <a:extLst>
               <a:ext uri="{91240B29-F687-4f45-9708-019B960494DF}">
-                <a14:hiddenLine xmlns:a14="http://schemas.microsoft.com/office/drawing/2010/main" xmlns="" w="9525">
+                <a14:hiddenLine xmlns="" xmlns:a14="http://schemas.microsoft.com/office/drawing/2010/main" w="9525">
                   <a:solidFill>
                     <a:srgbClr val="000000"/>
                   </a:solidFill>
@@ -2196,7 +2204,7 @@
             </a:ln>
             <a:extLst>
               <a:ext uri="{91240B29-F687-4f45-9708-019B960494DF}">
-                <a14:hiddenLine xmlns:a14="http://schemas.microsoft.com/office/drawing/2010/main" xmlns="" w="9525">
+                <a14:hiddenLine xmlns="" xmlns:a14="http://schemas.microsoft.com/office/drawing/2010/main" w="9525">
                   <a:solidFill>
                     <a:srgbClr val="000000"/>
                   </a:solidFill>
@@ -2286,7 +2294,7 @@
             </a:ln>
             <a:extLst>
               <a:ext uri="{91240B29-F687-4f45-9708-019B960494DF}">
-                <a14:hiddenLine xmlns:a14="http://schemas.microsoft.com/office/drawing/2010/main" xmlns="" w="9525">
+                <a14:hiddenLine xmlns="" xmlns:a14="http://schemas.microsoft.com/office/drawing/2010/main" w="9525">
                   <a:solidFill>
                     <a:srgbClr val="000000"/>
                   </a:solidFill>
@@ -2342,7 +2350,7 @@
             </a:ln>
             <a:extLst>
               <a:ext uri="{91240B29-F687-4f45-9708-019B960494DF}">
-                <a14:hiddenLine xmlns:a14="http://schemas.microsoft.com/office/drawing/2010/main" xmlns="" w="9525">
+                <a14:hiddenLine xmlns="" xmlns:a14="http://schemas.microsoft.com/office/drawing/2010/main" w="9525">
                   <a:solidFill>
                     <a:srgbClr val="000000"/>
                   </a:solidFill>
@@ -2432,7 +2440,7 @@
             </a:ln>
             <a:extLst>
               <a:ext uri="{91240B29-F687-4f45-9708-019B960494DF}">
-                <a14:hiddenLine xmlns:a14="http://schemas.microsoft.com/office/drawing/2010/main" xmlns="" w="9525">
+                <a14:hiddenLine xmlns="" xmlns:a14="http://schemas.microsoft.com/office/drawing/2010/main" w="9525">
                   <a:solidFill>
                     <a:srgbClr val="000000"/>
                   </a:solidFill>
@@ -2488,7 +2496,7 @@
             </a:ln>
             <a:extLst>
               <a:ext uri="{91240B29-F687-4f45-9708-019B960494DF}">
-                <a14:hiddenLine xmlns:a14="http://schemas.microsoft.com/office/drawing/2010/main" xmlns="" w="9525">
+                <a14:hiddenLine xmlns="" xmlns:a14="http://schemas.microsoft.com/office/drawing/2010/main" w="9525">
                   <a:solidFill>
                     <a:srgbClr val="000000"/>
                   </a:solidFill>
@@ -2578,7 +2586,7 @@
             </a:ln>
             <a:extLst>
               <a:ext uri="{91240B29-F687-4f45-9708-019B960494DF}">
-                <a14:hiddenLine xmlns:a14="http://schemas.microsoft.com/office/drawing/2010/main" xmlns="" w="9525">
+                <a14:hiddenLine xmlns="" xmlns:a14="http://schemas.microsoft.com/office/drawing/2010/main" w="9525">
                   <a:solidFill>
                     <a:srgbClr val="000000"/>
                   </a:solidFill>
@@ -2646,7 +2654,7 @@
             </a:ln>
             <a:extLst>
               <a:ext uri="{91240B29-F687-4f45-9708-019B960494DF}">
-                <a14:hiddenLine xmlns:a14="http://schemas.microsoft.com/office/drawing/2010/main" xmlns="" w="9525">
+                <a14:hiddenLine xmlns="" xmlns:a14="http://schemas.microsoft.com/office/drawing/2010/main" w="9525">
                   <a:solidFill>
                     <a:srgbClr val="000000"/>
                   </a:solidFill>
@@ -2736,7 +2744,7 @@
             </a:ln>
             <a:extLst>
               <a:ext uri="{91240B29-F687-4f45-9708-019B960494DF}">
-                <a14:hiddenLine xmlns:a14="http://schemas.microsoft.com/office/drawing/2010/main" xmlns="" w="9525">
+                <a14:hiddenLine xmlns="" xmlns:a14="http://schemas.microsoft.com/office/drawing/2010/main" w="9525">
                   <a:solidFill>
                     <a:srgbClr val="000000"/>
                   </a:solidFill>
@@ -2804,7 +2812,7 @@
             </a:ln>
             <a:extLst>
               <a:ext uri="{91240B29-F687-4f45-9708-019B960494DF}">
-                <a14:hiddenLine xmlns:a14="http://schemas.microsoft.com/office/drawing/2010/main" xmlns="" w="9525">
+                <a14:hiddenLine xmlns="" xmlns:a14="http://schemas.microsoft.com/office/drawing/2010/main" w="9525">
                   <a:solidFill>
                     <a:srgbClr val="000000"/>
                   </a:solidFill>
@@ -2894,7 +2902,7 @@
             </a:ln>
             <a:extLst>
               <a:ext uri="{91240B29-F687-4f45-9708-019B960494DF}">
-                <a14:hiddenLine xmlns:a14="http://schemas.microsoft.com/office/drawing/2010/main" xmlns="" w="9525">
+                <a14:hiddenLine xmlns="" xmlns:a14="http://schemas.microsoft.com/office/drawing/2010/main" w="9525">
                   <a:solidFill>
                     <a:srgbClr val="000000"/>
                   </a:solidFill>
@@ -2928,7 +2936,7 @@
             </a:ln>
             <a:extLst>
               <a:ext uri="{91240B29-F687-4f45-9708-019B960494DF}">
-                <a14:hiddenLine xmlns:a14="http://schemas.microsoft.com/office/drawing/2010/main" xmlns="" w="9525">
+                <a14:hiddenLine xmlns="" xmlns:a14="http://schemas.microsoft.com/office/drawing/2010/main" w="9525">
                   <a:solidFill>
                     <a:srgbClr val="000000"/>
                   </a:solidFill>
@@ -3018,7 +3026,7 @@
             </a:ln>
             <a:extLst>
               <a:ext uri="{91240B29-F687-4f45-9708-019B960494DF}">
-                <a14:hiddenLine xmlns:a14="http://schemas.microsoft.com/office/drawing/2010/main" xmlns="" w="9525">
+                <a14:hiddenLine xmlns="" xmlns:a14="http://schemas.microsoft.com/office/drawing/2010/main" w="9525">
                   <a:solidFill>
                     <a:srgbClr val="000000"/>
                   </a:solidFill>
@@ -3080,7 +3088,7 @@
             </a:ln>
             <a:extLst>
               <a:ext uri="{91240B29-F687-4f45-9708-019B960494DF}">
-                <a14:hiddenLine xmlns:a14="http://schemas.microsoft.com/office/drawing/2010/main" xmlns="" w="9525">
+                <a14:hiddenLine xmlns="" xmlns:a14="http://schemas.microsoft.com/office/drawing/2010/main" w="9525">
                   <a:solidFill>
                     <a:srgbClr val="000000"/>
                   </a:solidFill>
@@ -3142,7 +3150,7 @@
             </a:ln>
             <a:extLst>
               <a:ext uri="{91240B29-F687-4f45-9708-019B960494DF}">
-                <a14:hiddenLine xmlns:a14="http://schemas.microsoft.com/office/drawing/2010/main" xmlns="" w="9525">
+                <a14:hiddenLine xmlns="" xmlns:a14="http://schemas.microsoft.com/office/drawing/2010/main" w="9525">
                   <a:solidFill>
                     <a:srgbClr val="000000"/>
                   </a:solidFill>
@@ -3232,7 +3240,7 @@
             </a:ln>
             <a:extLst>
               <a:ext uri="{91240B29-F687-4f45-9708-019B960494DF}">
-                <a14:hiddenLine xmlns:a14="http://schemas.microsoft.com/office/drawing/2010/main" xmlns="" w="9525">
+                <a14:hiddenLine xmlns="" xmlns:a14="http://schemas.microsoft.com/office/drawing/2010/main" w="9525">
                   <a:solidFill>
                     <a:srgbClr val="000000"/>
                   </a:solidFill>
@@ -3300,7 +3308,7 @@
             </a:ln>
             <a:extLst>
               <a:ext uri="{91240B29-F687-4f45-9708-019B960494DF}">
-                <a14:hiddenLine xmlns:a14="http://schemas.microsoft.com/office/drawing/2010/main" xmlns="" w="9525">
+                <a14:hiddenLine xmlns="" xmlns:a14="http://schemas.microsoft.com/office/drawing/2010/main" w="9525">
                   <a:solidFill>
                     <a:srgbClr val="000000"/>
                   </a:solidFill>
@@ -3362,7 +3370,7 @@
             </a:ln>
             <a:extLst>
               <a:ext uri="{91240B29-F687-4f45-9708-019B960494DF}">
-                <a14:hiddenLine xmlns:a14="http://schemas.microsoft.com/office/drawing/2010/main" xmlns="" w="9525">
+                <a14:hiddenLine xmlns="" xmlns:a14="http://schemas.microsoft.com/office/drawing/2010/main" w="9525">
                   <a:solidFill>
                     <a:srgbClr val="000000"/>
                   </a:solidFill>
@@ -3452,7 +3460,7 @@
             </a:ln>
             <a:extLst>
               <a:ext uri="{91240B29-F687-4f45-9708-019B960494DF}">
-                <a14:hiddenLine xmlns:a14="http://schemas.microsoft.com/office/drawing/2010/main" xmlns="" w="9525">
+                <a14:hiddenLine xmlns="" xmlns:a14="http://schemas.microsoft.com/office/drawing/2010/main" w="9525">
                   <a:solidFill>
                     <a:srgbClr val="000000"/>
                   </a:solidFill>
@@ -3514,7 +3522,7 @@
             </a:ln>
             <a:extLst>
               <a:ext uri="{91240B29-F687-4f45-9708-019B960494DF}">
-                <a14:hiddenLine xmlns:a14="http://schemas.microsoft.com/office/drawing/2010/main" xmlns="" w="9525">
+                <a14:hiddenLine xmlns="" xmlns:a14="http://schemas.microsoft.com/office/drawing/2010/main" w="9525">
                   <a:solidFill>
                     <a:srgbClr val="000000"/>
                   </a:solidFill>
@@ -3604,7 +3612,7 @@
             </a:ln>
             <a:extLst>
               <a:ext uri="{91240B29-F687-4f45-9708-019B960494DF}">
-                <a14:hiddenLine xmlns:a14="http://schemas.microsoft.com/office/drawing/2010/main" xmlns="" w="9525">
+                <a14:hiddenLine xmlns="" xmlns:a14="http://schemas.microsoft.com/office/drawing/2010/main" w="9525">
                   <a:solidFill>
                     <a:srgbClr val="000000"/>
                   </a:solidFill>
@@ -3666,7 +3674,7 @@
             </a:ln>
             <a:extLst>
               <a:ext uri="{91240B29-F687-4f45-9708-019B960494DF}">
-                <a14:hiddenLine xmlns:a14="http://schemas.microsoft.com/office/drawing/2010/main" xmlns="" w="9525">
+                <a14:hiddenLine xmlns="" xmlns:a14="http://schemas.microsoft.com/office/drawing/2010/main" w="9525">
                   <a:solidFill>
                     <a:srgbClr val="000000"/>
                   </a:solidFill>
@@ -3756,7 +3764,7 @@
             </a:ln>
             <a:extLst>
               <a:ext uri="{91240B29-F687-4f45-9708-019B960494DF}">
-                <a14:hiddenLine xmlns:a14="http://schemas.microsoft.com/office/drawing/2010/main" xmlns="" w="9525">
+                <a14:hiddenLine xmlns="" xmlns:a14="http://schemas.microsoft.com/office/drawing/2010/main" w="9525">
                   <a:solidFill>
                     <a:srgbClr val="000000"/>
                   </a:solidFill>
@@ -3790,7 +3798,7 @@
             </a:ln>
             <a:extLst>
               <a:ext uri="{91240B29-F687-4f45-9708-019B960494DF}">
-                <a14:hiddenLine xmlns:a14="http://schemas.microsoft.com/office/drawing/2010/main" xmlns="" w="9525">
+                <a14:hiddenLine xmlns="" xmlns:a14="http://schemas.microsoft.com/office/drawing/2010/main" w="9525">
                   <a:solidFill>
                     <a:srgbClr val="000000"/>
                   </a:solidFill>
@@ -3855,7 +3863,7 @@
             </a:ln>
             <a:extLst>
               <a:ext uri="{91240B29-F687-4f45-9708-019B960494DF}">
-                <a14:hiddenLine xmlns:a14="http://schemas.microsoft.com/office/drawing/2010/main" xmlns="" w="9525">
+                <a14:hiddenLine xmlns="" xmlns:a14="http://schemas.microsoft.com/office/drawing/2010/main" w="9525">
                   <a:solidFill>
                     <a:srgbClr val="000000"/>
                   </a:solidFill>
@@ -3945,7 +3953,7 @@
             </a:ln>
             <a:extLst>
               <a:ext uri="{91240B29-F687-4f45-9708-019B960494DF}">
-                <a14:hiddenLine xmlns:a14="http://schemas.microsoft.com/office/drawing/2010/main" xmlns="" w="9525">
+                <a14:hiddenLine xmlns="" xmlns:a14="http://schemas.microsoft.com/office/drawing/2010/main" w="9525">
                   <a:solidFill>
                     <a:srgbClr val="000000"/>
                   </a:solidFill>
@@ -4007,7 +4015,7 @@
             </a:ln>
             <a:extLst>
               <a:ext uri="{91240B29-F687-4f45-9708-019B960494DF}">
-                <a14:hiddenLine xmlns:a14="http://schemas.microsoft.com/office/drawing/2010/main" xmlns="" w="9525">
+                <a14:hiddenLine xmlns="" xmlns:a14="http://schemas.microsoft.com/office/drawing/2010/main" w="9525">
                   <a:solidFill>
                     <a:srgbClr val="000000"/>
                   </a:solidFill>
@@ -4097,7 +4105,7 @@
             </a:ln>
             <a:extLst>
               <a:ext uri="{91240B29-F687-4f45-9708-019B960494DF}">
-                <a14:hiddenLine xmlns:a14="http://schemas.microsoft.com/office/drawing/2010/main" xmlns="" w="9525">
+                <a14:hiddenLine xmlns="" xmlns:a14="http://schemas.microsoft.com/office/drawing/2010/main" w="9525">
                   <a:solidFill>
                     <a:srgbClr val="000000"/>
                   </a:solidFill>
@@ -4187,7 +4195,7 @@
             </a:ln>
             <a:extLst>
               <a:ext uri="{91240B29-F687-4f45-9708-019B960494DF}">
-                <a14:hiddenLine xmlns:a14="http://schemas.microsoft.com/office/drawing/2010/main" xmlns="" w="9525">
+                <a14:hiddenLine xmlns="" xmlns:a14="http://schemas.microsoft.com/office/drawing/2010/main" w="9525">
                   <a:solidFill>
                     <a:srgbClr val="000000"/>
                   </a:solidFill>
@@ -4252,7 +4260,7 @@
             </a:ln>
             <a:extLst>
               <a:ext uri="{91240B29-F687-4f45-9708-019B960494DF}">
-                <a14:hiddenLine xmlns:a14="http://schemas.microsoft.com/office/drawing/2010/main" xmlns="" w="9525">
+                <a14:hiddenLine xmlns="" xmlns:a14="http://schemas.microsoft.com/office/drawing/2010/main" w="9525">
                   <a:solidFill>
                     <a:srgbClr val="000000"/>
                   </a:solidFill>
@@ -4314,7 +4322,7 @@
             </a:ln>
             <a:extLst>
               <a:ext uri="{91240B29-F687-4f45-9708-019B960494DF}">
-                <a14:hiddenLine xmlns:a14="http://schemas.microsoft.com/office/drawing/2010/main" xmlns="" w="9525">
+                <a14:hiddenLine xmlns="" xmlns:a14="http://schemas.microsoft.com/office/drawing/2010/main" w="9525">
                   <a:solidFill>
                     <a:srgbClr val="000000"/>
                   </a:solidFill>
@@ -4404,7 +4412,7 @@
             </a:ln>
             <a:extLst>
               <a:ext uri="{91240B29-F687-4f45-9708-019B960494DF}">
-                <a14:hiddenLine xmlns:a14="http://schemas.microsoft.com/office/drawing/2010/main" xmlns="" w="9525">
+                <a14:hiddenLine xmlns="" xmlns:a14="http://schemas.microsoft.com/office/drawing/2010/main" w="9525">
                   <a:solidFill>
                     <a:srgbClr val="000000"/>
                   </a:solidFill>
@@ -4494,7 +4502,7 @@
             </a:ln>
             <a:extLst>
               <a:ext uri="{91240B29-F687-4f45-9708-019B960494DF}">
-                <a14:hiddenLine xmlns:a14="http://schemas.microsoft.com/office/drawing/2010/main" xmlns="" w="9525">
+                <a14:hiddenLine xmlns="" xmlns:a14="http://schemas.microsoft.com/office/drawing/2010/main" w="9525">
                   <a:solidFill>
                     <a:srgbClr val="000000"/>
                   </a:solidFill>
@@ -4556,7 +4564,7 @@
             </a:ln>
             <a:extLst>
               <a:ext uri="{91240B29-F687-4f45-9708-019B960494DF}">
-                <a14:hiddenLine xmlns:a14="http://schemas.microsoft.com/office/drawing/2010/main" xmlns="" w="9525">
+                <a14:hiddenLine xmlns="" xmlns:a14="http://schemas.microsoft.com/office/drawing/2010/main" w="9525">
                   <a:solidFill>
                     <a:srgbClr val="000000"/>
                   </a:solidFill>
@@ -4676,7 +4684,7 @@
             </a:ln>
             <a:extLst>
               <a:ext uri="{91240B29-F687-4f45-9708-019B960494DF}">
-                <a14:hiddenLine xmlns:a14="http://schemas.microsoft.com/office/drawing/2010/main" xmlns="" w="9525">
+                <a14:hiddenLine xmlns="" xmlns:a14="http://schemas.microsoft.com/office/drawing/2010/main" w="9525">
                   <a:solidFill>
                     <a:srgbClr val="000000"/>
                   </a:solidFill>
@@ -4744,7 +4752,7 @@
             </a:ln>
             <a:extLst>
               <a:ext uri="{91240B29-F687-4f45-9708-019B960494DF}">
-                <a14:hiddenLine xmlns:a14="http://schemas.microsoft.com/office/drawing/2010/main" xmlns="" w="9525">
+                <a14:hiddenLine xmlns="" xmlns:a14="http://schemas.microsoft.com/office/drawing/2010/main" w="9525">
                   <a:solidFill>
                     <a:srgbClr val="000000"/>
                   </a:solidFill>
@@ -4834,7 +4842,7 @@
             </a:ln>
             <a:extLst>
               <a:ext uri="{91240B29-F687-4f45-9708-019B960494DF}">
-                <a14:hiddenLine xmlns:a14="http://schemas.microsoft.com/office/drawing/2010/main" xmlns="" w="9525">
+                <a14:hiddenLine xmlns="" xmlns:a14="http://schemas.microsoft.com/office/drawing/2010/main" w="9525">
                   <a:solidFill>
                     <a:srgbClr val="000000"/>
                   </a:solidFill>
@@ -4974,7 +4982,7 @@
           <a:p>
             <a:fld id="{48A87A34-81AB-432B-8DAE-1953F412C126}" type="datetimeFigureOut">
               <a:rPr lang="en-US" smtClean="0"/>
-              <a:t>12/22/2024</a:t>
+              <a:t>12/28/2024</a:t>
             </a:fld>
             <a:endParaRPr lang="en-US" dirty="0"/>
           </a:p>
@@ -5241,7 +5249,7 @@
           <a:p>
             <a:fld id="{48A87A34-81AB-432B-8DAE-1953F412C126}" type="datetimeFigureOut">
               <a:rPr lang="en-US" smtClean="0"/>
-              <a:t>12/22/2024</a:t>
+              <a:t>12/28/2024</a:t>
             </a:fld>
             <a:endParaRPr lang="en-US" dirty="0"/>
           </a:p>
@@ -5437,7 +5445,7 @@
           <a:p>
             <a:fld id="{48A87A34-81AB-432B-8DAE-1953F412C126}" type="datetimeFigureOut">
               <a:rPr lang="en-US" smtClean="0"/>
-              <a:t>12/22/2024</a:t>
+              <a:t>12/28/2024</a:t>
             </a:fld>
             <a:endParaRPr lang="en-US" dirty="0"/>
           </a:p>
@@ -5700,7 +5708,7 @@
           <a:p>
             <a:fld id="{48A87A34-81AB-432B-8DAE-1953F412C126}" type="datetimeFigureOut">
               <a:rPr lang="en-US" smtClean="0"/>
-              <a:t>12/22/2024</a:t>
+              <a:t>12/28/2024</a:t>
             </a:fld>
             <a:endParaRPr lang="en-US" dirty="0"/>
           </a:p>
@@ -6134,7 +6142,7 @@
           <a:p>
             <a:fld id="{48A87A34-81AB-432B-8DAE-1953F412C126}" type="datetimeFigureOut">
               <a:rPr lang="en-US" smtClean="0"/>
-              <a:t>12/22/2024</a:t>
+              <a:t>12/28/2024</a:t>
             </a:fld>
             <a:endParaRPr lang="en-US" dirty="0"/>
           </a:p>
@@ -6680,7 +6688,7 @@
           <a:p>
             <a:fld id="{48A87A34-81AB-432B-8DAE-1953F412C126}" type="datetimeFigureOut">
               <a:rPr lang="en-US" smtClean="0"/>
-              <a:t>12/22/2024</a:t>
+              <a:t>12/28/2024</a:t>
             </a:fld>
             <a:endParaRPr lang="en-US" dirty="0"/>
           </a:p>
@@ -7400,7 +7408,7 @@
           <a:p>
             <a:fld id="{48A87A34-81AB-432B-8DAE-1953F412C126}" type="datetimeFigureOut">
               <a:rPr lang="en-US" smtClean="0"/>
-              <a:t>12/22/2024</a:t>
+              <a:t>12/28/2024</a:t>
             </a:fld>
             <a:endParaRPr lang="en-US" dirty="0"/>
           </a:p>
@@ -7570,7 +7578,7 @@
           <a:p>
             <a:fld id="{48A87A34-81AB-432B-8DAE-1953F412C126}" type="datetimeFigureOut">
               <a:rPr lang="en-US" smtClean="0"/>
-              <a:t>12/22/2024</a:t>
+              <a:t>12/28/2024</a:t>
             </a:fld>
             <a:endParaRPr lang="en-US" dirty="0"/>
           </a:p>
@@ -7750,7 +7758,7 @@
           <a:p>
             <a:fld id="{48A87A34-81AB-432B-8DAE-1953F412C126}" type="datetimeFigureOut">
               <a:rPr lang="en-US" smtClean="0"/>
-              <a:t>12/22/2024</a:t>
+              <a:t>12/28/2024</a:t>
             </a:fld>
             <a:endParaRPr lang="en-US" dirty="0"/>
           </a:p>
@@ -7920,7 +7928,7 @@
           <a:p>
             <a:fld id="{48A87A34-81AB-432B-8DAE-1953F412C126}" type="datetimeFigureOut">
               <a:rPr lang="en-US" smtClean="0"/>
-              <a:t>12/22/2024</a:t>
+              <a:t>12/28/2024</a:t>
             </a:fld>
             <a:endParaRPr lang="en-US" dirty="0"/>
           </a:p>
@@ -8170,7 +8178,7 @@
           <a:p>
             <a:fld id="{48A87A34-81AB-432B-8DAE-1953F412C126}" type="datetimeFigureOut">
               <a:rPr lang="en-US" smtClean="0"/>
-              <a:t>12/22/2024</a:t>
+              <a:t>12/28/2024</a:t>
             </a:fld>
             <a:endParaRPr lang="en-US" dirty="0"/>
           </a:p>
@@ -8402,7 +8410,7 @@
           <a:p>
             <a:fld id="{48A87A34-81AB-432B-8DAE-1953F412C126}" type="datetimeFigureOut">
               <a:rPr lang="en-US" smtClean="0"/>
-              <a:t>12/22/2024</a:t>
+              <a:t>12/28/2024</a:t>
             </a:fld>
             <a:endParaRPr lang="en-US" dirty="0"/>
           </a:p>
@@ -8783,7 +8791,7 @@
           <a:p>
             <a:fld id="{48A87A34-81AB-432B-8DAE-1953F412C126}" type="datetimeFigureOut">
               <a:rPr lang="en-US" smtClean="0"/>
-              <a:t>12/22/2024</a:t>
+              <a:t>12/28/2024</a:t>
             </a:fld>
             <a:endParaRPr lang="en-US" dirty="0"/>
           </a:p>
@@ -8901,7 +8909,7 @@
           <a:p>
             <a:fld id="{48A87A34-81AB-432B-8DAE-1953F412C126}" type="datetimeFigureOut">
               <a:rPr lang="en-US" smtClean="0"/>
-              <a:t>12/22/2024</a:t>
+              <a:t>12/28/2024</a:t>
             </a:fld>
             <a:endParaRPr lang="en-US" dirty="0"/>
           </a:p>
@@ -8996,7 +9004,7 @@
           <a:p>
             <a:fld id="{48A87A34-81AB-432B-8DAE-1953F412C126}" type="datetimeFigureOut">
               <a:rPr lang="en-US" smtClean="0"/>
-              <a:t>12/22/2024</a:t>
+              <a:t>12/28/2024</a:t>
             </a:fld>
             <a:endParaRPr lang="en-US" dirty="0"/>
           </a:p>
@@ -9245,7 +9253,7 @@
           <a:p>
             <a:fld id="{48A87A34-81AB-432B-8DAE-1953F412C126}" type="datetimeFigureOut">
               <a:rPr lang="en-US" smtClean="0"/>
-              <a:t>12/22/2024</a:t>
+              <a:t>12/28/2024</a:t>
             </a:fld>
             <a:endParaRPr lang="en-US" dirty="0"/>
           </a:p>
@@ -9525,7 +9533,7 @@
           <a:p>
             <a:fld id="{48A87A34-81AB-432B-8DAE-1953F412C126}" type="datetimeFigureOut">
               <a:rPr lang="en-US" smtClean="0"/>
-              <a:t>12/22/2024</a:t>
+              <a:t>12/28/2024</a:t>
             </a:fld>
             <a:endParaRPr lang="en-US" dirty="0"/>
           </a:p>
@@ -9648,7 +9656,7 @@
           <a:noFill/>
           <a:extLst>
             <a:ext uri="{909E8E84-426E-40dd-AFC4-6F175D3DCCD1}">
-              <a14:hiddenFill xmlns:a14="http://schemas.microsoft.com/office/drawing/2010/main" xmlns="">
+              <a14:hiddenFill xmlns="" xmlns:a14="http://schemas.microsoft.com/office/drawing/2010/main">
                 <a:solidFill>
                   <a:srgbClr val="FFFFFF"/>
                 </a:solidFill>
@@ -9722,7 +9730,7 @@
               </a:ln>
               <a:extLst>
                 <a:ext uri="{91240B29-F687-4f45-9708-019B960494DF}">
-                  <a14:hiddenLine xmlns:a14="http://schemas.microsoft.com/office/drawing/2010/main" xmlns="" w="9525">
+                  <a14:hiddenLine xmlns="" xmlns:a14="http://schemas.microsoft.com/office/drawing/2010/main" w="9525">
                     <a:solidFill>
                       <a:srgbClr val="000000"/>
                     </a:solidFill>
@@ -9812,7 +9820,7 @@
               </a:ln>
               <a:extLst>
                 <a:ext uri="{91240B29-F687-4f45-9708-019B960494DF}">
-                  <a14:hiddenLine xmlns:a14="http://schemas.microsoft.com/office/drawing/2010/main" xmlns="" w="9525">
+                  <a14:hiddenLine xmlns="" xmlns:a14="http://schemas.microsoft.com/office/drawing/2010/main" w="9525">
                     <a:solidFill>
                       <a:srgbClr val="000000"/>
                     </a:solidFill>
@@ -9902,7 +9910,7 @@
               </a:ln>
               <a:extLst>
                 <a:ext uri="{91240B29-F687-4f45-9708-019B960494DF}">
-                  <a14:hiddenLine xmlns:a14="http://schemas.microsoft.com/office/drawing/2010/main" xmlns="" w="9525">
+                  <a14:hiddenLine xmlns="" xmlns:a14="http://schemas.microsoft.com/office/drawing/2010/main" w="9525">
                     <a:solidFill>
                       <a:srgbClr val="000000"/>
                     </a:solidFill>
@@ -9964,7 +9972,7 @@
               </a:ln>
               <a:extLst>
                 <a:ext uri="{91240B29-F687-4f45-9708-019B960494DF}">
-                  <a14:hiddenLine xmlns:a14="http://schemas.microsoft.com/office/drawing/2010/main" xmlns="" w="9525">
+                  <a14:hiddenLine xmlns="" xmlns:a14="http://schemas.microsoft.com/office/drawing/2010/main" w="9525">
                     <a:solidFill>
                       <a:srgbClr val="000000"/>
                     </a:solidFill>
@@ -10054,7 +10062,7 @@
               </a:ln>
               <a:extLst>
                 <a:ext uri="{91240B29-F687-4f45-9708-019B960494DF}">
-                  <a14:hiddenLine xmlns:a14="http://schemas.microsoft.com/office/drawing/2010/main" xmlns="" w="9525">
+                  <a14:hiddenLine xmlns="" xmlns:a14="http://schemas.microsoft.com/office/drawing/2010/main" w="9525">
                     <a:solidFill>
                       <a:srgbClr val="000000"/>
                     </a:solidFill>
@@ -10116,7 +10124,7 @@
               </a:ln>
               <a:extLst>
                 <a:ext uri="{91240B29-F687-4f45-9708-019B960494DF}">
-                  <a14:hiddenLine xmlns:a14="http://schemas.microsoft.com/office/drawing/2010/main" xmlns="" w="9525">
+                  <a14:hiddenLine xmlns="" xmlns:a14="http://schemas.microsoft.com/office/drawing/2010/main" w="9525">
                     <a:solidFill>
                       <a:srgbClr val="000000"/>
                     </a:solidFill>
@@ -10178,7 +10186,7 @@
               </a:ln>
               <a:extLst>
                 <a:ext uri="{91240B29-F687-4f45-9708-019B960494DF}">
-                  <a14:hiddenLine xmlns:a14="http://schemas.microsoft.com/office/drawing/2010/main" xmlns="" w="9525">
+                  <a14:hiddenLine xmlns="" xmlns:a14="http://schemas.microsoft.com/office/drawing/2010/main" w="9525">
                     <a:solidFill>
                       <a:srgbClr val="000000"/>
                     </a:solidFill>
@@ -10268,7 +10276,7 @@
               </a:ln>
               <a:extLst>
                 <a:ext uri="{91240B29-F687-4f45-9708-019B960494DF}">
-                  <a14:hiddenLine xmlns:a14="http://schemas.microsoft.com/office/drawing/2010/main" xmlns="" w="9525">
+                  <a14:hiddenLine xmlns="" xmlns:a14="http://schemas.microsoft.com/office/drawing/2010/main" w="9525">
                     <a:solidFill>
                       <a:srgbClr val="000000"/>
                     </a:solidFill>
@@ -10358,7 +10366,7 @@
               </a:ln>
               <a:extLst>
                 <a:ext uri="{91240B29-F687-4f45-9708-019B960494DF}">
-                  <a14:hiddenLine xmlns:a14="http://schemas.microsoft.com/office/drawing/2010/main" xmlns="" w="9525">
+                  <a14:hiddenLine xmlns="" xmlns:a14="http://schemas.microsoft.com/office/drawing/2010/main" w="9525">
                     <a:solidFill>
                       <a:srgbClr val="000000"/>
                     </a:solidFill>
@@ -10420,7 +10428,7 @@
               </a:ln>
               <a:extLst>
                 <a:ext uri="{91240B29-F687-4f45-9708-019B960494DF}">
-                  <a14:hiddenLine xmlns:a14="http://schemas.microsoft.com/office/drawing/2010/main" xmlns="" w="9525">
+                  <a14:hiddenLine xmlns="" xmlns:a14="http://schemas.microsoft.com/office/drawing/2010/main" w="9525">
                     <a:solidFill>
                       <a:srgbClr val="000000"/>
                     </a:solidFill>
@@ -10530,7 +10538,7 @@
               </a:ln>
               <a:extLst>
                 <a:ext uri="{91240B29-F687-4f45-9708-019B960494DF}">
-                  <a14:hiddenLine xmlns:a14="http://schemas.microsoft.com/office/drawing/2010/main" xmlns="" w="9525">
+                  <a14:hiddenLine xmlns="" xmlns:a14="http://schemas.microsoft.com/office/drawing/2010/main" w="9525">
                     <a:solidFill>
                       <a:srgbClr val="000000"/>
                     </a:solidFill>
@@ -10614,7 +10622,7 @@
               </a:ln>
               <a:extLst>
                 <a:ext uri="{91240B29-F687-4f45-9708-019B960494DF}">
-                  <a14:hiddenLine xmlns:a14="http://schemas.microsoft.com/office/drawing/2010/main" xmlns="" w="9525">
+                  <a14:hiddenLine xmlns="" xmlns:a14="http://schemas.microsoft.com/office/drawing/2010/main" w="9525">
                     <a:solidFill>
                       <a:srgbClr val="000000"/>
                     </a:solidFill>
@@ -10676,7 +10684,7 @@
               </a:ln>
               <a:extLst>
                 <a:ext uri="{91240B29-F687-4f45-9708-019B960494DF}">
-                  <a14:hiddenLine xmlns:a14="http://schemas.microsoft.com/office/drawing/2010/main" xmlns="" w="9525">
+                  <a14:hiddenLine xmlns="" xmlns:a14="http://schemas.microsoft.com/office/drawing/2010/main" w="9525">
                     <a:solidFill>
                       <a:srgbClr val="000000"/>
                     </a:solidFill>
@@ -10738,7 +10746,7 @@
               </a:ln>
               <a:extLst>
                 <a:ext uri="{91240B29-F687-4f45-9708-019B960494DF}">
-                  <a14:hiddenLine xmlns:a14="http://schemas.microsoft.com/office/drawing/2010/main" xmlns="" w="9525">
+                  <a14:hiddenLine xmlns="" xmlns:a14="http://schemas.microsoft.com/office/drawing/2010/main" w="9525">
                     <a:solidFill>
                       <a:srgbClr val="000000"/>
                     </a:solidFill>
@@ -10828,7 +10836,7 @@
               </a:ln>
               <a:extLst>
                 <a:ext uri="{91240B29-F687-4f45-9708-019B960494DF}">
-                  <a14:hiddenLine xmlns:a14="http://schemas.microsoft.com/office/drawing/2010/main" xmlns="" w="9525">
+                  <a14:hiddenLine xmlns="" xmlns:a14="http://schemas.microsoft.com/office/drawing/2010/main" w="9525">
                     <a:solidFill>
                       <a:srgbClr val="000000"/>
                     </a:solidFill>
@@ -10862,7 +10870,7 @@
               </a:ln>
               <a:extLst>
                 <a:ext uri="{91240B29-F687-4f45-9708-019B960494DF}">
-                  <a14:hiddenLine xmlns:a14="http://schemas.microsoft.com/office/drawing/2010/main" xmlns="" w="9525">
+                  <a14:hiddenLine xmlns="" xmlns:a14="http://schemas.microsoft.com/office/drawing/2010/main" w="9525">
                     <a:solidFill>
                       <a:srgbClr val="000000"/>
                     </a:solidFill>
@@ -10927,7 +10935,7 @@
               </a:ln>
               <a:extLst>
                 <a:ext uri="{91240B29-F687-4f45-9708-019B960494DF}">
-                  <a14:hiddenLine xmlns:a14="http://schemas.microsoft.com/office/drawing/2010/main" xmlns="" w="9525">
+                  <a14:hiddenLine xmlns="" xmlns:a14="http://schemas.microsoft.com/office/drawing/2010/main" w="9525">
                     <a:solidFill>
                       <a:srgbClr val="000000"/>
                     </a:solidFill>
@@ -11017,7 +11025,7 @@
               </a:ln>
               <a:extLst>
                 <a:ext uri="{91240B29-F687-4f45-9708-019B960494DF}">
-                  <a14:hiddenLine xmlns:a14="http://schemas.microsoft.com/office/drawing/2010/main" xmlns="" w="9525">
+                  <a14:hiddenLine xmlns="" xmlns:a14="http://schemas.microsoft.com/office/drawing/2010/main" w="9525">
                     <a:solidFill>
                       <a:srgbClr val="000000"/>
                     </a:solidFill>
@@ -11079,7 +11087,7 @@
               </a:ln>
               <a:extLst>
                 <a:ext uri="{91240B29-F687-4f45-9708-019B960494DF}">
-                  <a14:hiddenLine xmlns:a14="http://schemas.microsoft.com/office/drawing/2010/main" xmlns="" w="9525">
+                  <a14:hiddenLine xmlns="" xmlns:a14="http://schemas.microsoft.com/office/drawing/2010/main" w="9525">
                     <a:solidFill>
                       <a:srgbClr val="000000"/>
                     </a:solidFill>
@@ -11169,7 +11177,7 @@
               </a:ln>
               <a:extLst>
                 <a:ext uri="{91240B29-F687-4f45-9708-019B960494DF}">
-                  <a14:hiddenLine xmlns:a14="http://schemas.microsoft.com/office/drawing/2010/main" xmlns="" w="9525">
+                  <a14:hiddenLine xmlns="" xmlns:a14="http://schemas.microsoft.com/office/drawing/2010/main" w="9525">
                     <a:solidFill>
                       <a:srgbClr val="000000"/>
                     </a:solidFill>
@@ -11234,7 +11242,7 @@
               </a:ln>
               <a:extLst>
                 <a:ext uri="{91240B29-F687-4f45-9708-019B960494DF}">
-                  <a14:hiddenLine xmlns:a14="http://schemas.microsoft.com/office/drawing/2010/main" xmlns="" w="9525">
+                  <a14:hiddenLine xmlns="" xmlns:a14="http://schemas.microsoft.com/office/drawing/2010/main" w="9525">
                     <a:solidFill>
                       <a:srgbClr val="000000"/>
                     </a:solidFill>
@@ -11296,7 +11304,7 @@
               </a:ln>
               <a:extLst>
                 <a:ext uri="{91240B29-F687-4f45-9708-019B960494DF}">
-                  <a14:hiddenLine xmlns:a14="http://schemas.microsoft.com/office/drawing/2010/main" xmlns="" w="9525">
+                  <a14:hiddenLine xmlns="" xmlns:a14="http://schemas.microsoft.com/office/drawing/2010/main" w="9525">
                     <a:solidFill>
                       <a:srgbClr val="000000"/>
                     </a:solidFill>
@@ -11386,7 +11394,7 @@
               </a:ln>
               <a:extLst>
                 <a:ext uri="{91240B29-F687-4f45-9708-019B960494DF}">
-                  <a14:hiddenLine xmlns:a14="http://schemas.microsoft.com/office/drawing/2010/main" xmlns="" w="9525">
+                  <a14:hiddenLine xmlns="" xmlns:a14="http://schemas.microsoft.com/office/drawing/2010/main" w="9525">
                     <a:solidFill>
                       <a:srgbClr val="000000"/>
                     </a:solidFill>
@@ -11476,7 +11484,7 @@
               </a:ln>
               <a:extLst>
                 <a:ext uri="{91240B29-F687-4f45-9708-019B960494DF}">
-                  <a14:hiddenLine xmlns:a14="http://schemas.microsoft.com/office/drawing/2010/main" xmlns="" w="9525">
+                  <a14:hiddenLine xmlns="" xmlns:a14="http://schemas.microsoft.com/office/drawing/2010/main" w="9525">
                     <a:solidFill>
                       <a:srgbClr val="000000"/>
                     </a:solidFill>
@@ -11541,7 +11549,7 @@
               </a:ln>
               <a:extLst>
                 <a:ext uri="{91240B29-F687-4f45-9708-019B960494DF}">
-                  <a14:hiddenLine xmlns:a14="http://schemas.microsoft.com/office/drawing/2010/main" xmlns="" w="9525">
+                  <a14:hiddenLine xmlns="" xmlns:a14="http://schemas.microsoft.com/office/drawing/2010/main" w="9525">
                     <a:solidFill>
                       <a:srgbClr val="000000"/>
                     </a:solidFill>
@@ -11661,7 +11669,7 @@
               </a:ln>
               <a:extLst>
                 <a:ext uri="{91240B29-F687-4f45-9708-019B960494DF}">
-                  <a14:hiddenLine xmlns:a14="http://schemas.microsoft.com/office/drawing/2010/main" xmlns="" w="9525">
+                  <a14:hiddenLine xmlns="" xmlns:a14="http://schemas.microsoft.com/office/drawing/2010/main" w="9525">
                     <a:solidFill>
                       <a:srgbClr val="000000"/>
                     </a:solidFill>
@@ -11742,7 +11750,7 @@
               </a:ln>
               <a:extLst>
                 <a:ext uri="{91240B29-F687-4f45-9708-019B960494DF}">
-                  <a14:hiddenLine xmlns:a14="http://schemas.microsoft.com/office/drawing/2010/main" xmlns="" w="9525">
+                  <a14:hiddenLine xmlns="" xmlns:a14="http://schemas.microsoft.com/office/drawing/2010/main" w="9525">
                     <a:solidFill>
                       <a:srgbClr val="000000"/>
                     </a:solidFill>
@@ -11857,7 +11865,7 @@
               </a:ln>
               <a:extLst>
                 <a:ext uri="{91240B29-F687-4f45-9708-019B960494DF}">
-                  <a14:hiddenLine xmlns:a14="http://schemas.microsoft.com/office/drawing/2010/main" xmlns="" w="9525">
+                  <a14:hiddenLine xmlns="" xmlns:a14="http://schemas.microsoft.com/office/drawing/2010/main" w="9525">
                     <a:solidFill>
                       <a:srgbClr val="000000"/>
                     </a:solidFill>
@@ -11947,7 +11955,7 @@
               </a:ln>
               <a:extLst>
                 <a:ext uri="{91240B29-F687-4f45-9708-019B960494DF}">
-                  <a14:hiddenLine xmlns:a14="http://schemas.microsoft.com/office/drawing/2010/main" xmlns="" w="9525">
+                  <a14:hiddenLine xmlns="" xmlns:a14="http://schemas.microsoft.com/office/drawing/2010/main" w="9525">
                     <a:solidFill>
                       <a:srgbClr val="000000"/>
                     </a:solidFill>
@@ -12012,7 +12020,7 @@
               </a:ln>
               <a:extLst>
                 <a:ext uri="{91240B29-F687-4f45-9708-019B960494DF}">
-                  <a14:hiddenLine xmlns:a14="http://schemas.microsoft.com/office/drawing/2010/main" xmlns="" w="9525">
+                  <a14:hiddenLine xmlns="" xmlns:a14="http://schemas.microsoft.com/office/drawing/2010/main" w="9525">
                     <a:solidFill>
                       <a:srgbClr val="000000"/>
                     </a:solidFill>
@@ -12102,7 +12110,7 @@
               </a:ln>
               <a:extLst>
                 <a:ext uri="{91240B29-F687-4f45-9708-019B960494DF}">
-                  <a14:hiddenLine xmlns:a14="http://schemas.microsoft.com/office/drawing/2010/main" xmlns="" w="9525">
+                  <a14:hiddenLine xmlns="" xmlns:a14="http://schemas.microsoft.com/office/drawing/2010/main" w="9525">
                     <a:solidFill>
                       <a:srgbClr val="000000"/>
                     </a:solidFill>
@@ -12170,7 +12178,7 @@
               </a:ln>
               <a:extLst>
                 <a:ext uri="{91240B29-F687-4f45-9708-019B960494DF}">
-                  <a14:hiddenLine xmlns:a14="http://schemas.microsoft.com/office/drawing/2010/main" xmlns="" w="9525">
+                  <a14:hiddenLine xmlns="" xmlns:a14="http://schemas.microsoft.com/office/drawing/2010/main" w="9525">
                     <a:solidFill>
                       <a:srgbClr val="000000"/>
                     </a:solidFill>
@@ -12260,7 +12268,7 @@
               </a:ln>
               <a:extLst>
                 <a:ext uri="{91240B29-F687-4f45-9708-019B960494DF}">
-                  <a14:hiddenLine xmlns:a14="http://schemas.microsoft.com/office/drawing/2010/main" xmlns="" w="9525">
+                  <a14:hiddenLine xmlns="" xmlns:a14="http://schemas.microsoft.com/office/drawing/2010/main" w="9525">
                     <a:solidFill>
                       <a:srgbClr val="000000"/>
                     </a:solidFill>
@@ -12328,7 +12336,7 @@
               </a:ln>
               <a:extLst>
                 <a:ext uri="{91240B29-F687-4f45-9708-019B960494DF}">
-                  <a14:hiddenLine xmlns:a14="http://schemas.microsoft.com/office/drawing/2010/main" xmlns="" w="9525">
+                  <a14:hiddenLine xmlns="" xmlns:a14="http://schemas.microsoft.com/office/drawing/2010/main" w="9525">
                     <a:solidFill>
                       <a:srgbClr val="000000"/>
                     </a:solidFill>
@@ -12418,7 +12426,7 @@
               </a:ln>
               <a:extLst>
                 <a:ext uri="{91240B29-F687-4f45-9708-019B960494DF}">
-                  <a14:hiddenLine xmlns:a14="http://schemas.microsoft.com/office/drawing/2010/main" xmlns="" w="9525">
+                  <a14:hiddenLine xmlns="" xmlns:a14="http://schemas.microsoft.com/office/drawing/2010/main" w="9525">
                     <a:solidFill>
                       <a:srgbClr val="000000"/>
                     </a:solidFill>
@@ -12452,7 +12460,7 @@
               </a:ln>
               <a:extLst>
                 <a:ext uri="{91240B29-F687-4f45-9708-019B960494DF}">
-                  <a14:hiddenLine xmlns:a14="http://schemas.microsoft.com/office/drawing/2010/main" xmlns="" w="9525">
+                  <a14:hiddenLine xmlns="" xmlns:a14="http://schemas.microsoft.com/office/drawing/2010/main" w="9525">
                     <a:solidFill>
                       <a:srgbClr val="000000"/>
                     </a:solidFill>
@@ -12593,7 +12601,7 @@
             <a:fld id="{48A87A34-81AB-432B-8DAE-1953F412C126}" type="datetimeFigureOut">
               <a:rPr lang="en-US" smtClean="0"/>
               <a:pPr/>
-              <a:t>12/22/2024</a:t>
+              <a:t>12/28/2024</a:t>
             </a:fld>
             <a:endParaRPr lang="en-US" dirty="0"/>
           </a:p>
@@ -13019,7 +13027,7 @@
           <p:cNvPr id="2" name="Title 1">
             <a:extLst>
               <a:ext uri="{FF2B5EF4-FFF2-40B4-BE49-F238E27FC236}">
-                <a16:creationId xmlns="" xmlns:a16="http://schemas.microsoft.com/office/drawing/2014/main" id="{8268D3E5-C7A3-47DF-A374-46BF83A69904}"/>
+                <a16:creationId xmlns:a16="http://schemas.microsoft.com/office/drawing/2014/main" xmlns="" id="{8268D3E5-C7A3-47DF-A374-46BF83A69904}"/>
               </a:ext>
             </a:extLst>
           </p:cNvPr>
@@ -13066,7 +13074,7 @@
           <p:cNvPr id="3" name="Subtitle 2">
             <a:extLst>
               <a:ext uri="{FF2B5EF4-FFF2-40B4-BE49-F238E27FC236}">
-                <a16:creationId xmlns="" xmlns:a16="http://schemas.microsoft.com/office/drawing/2014/main" id="{2E78725B-6E40-4D82-B375-7831D81C29EE}"/>
+                <a16:creationId xmlns:a16="http://schemas.microsoft.com/office/drawing/2014/main" xmlns="" id="{2E78725B-6E40-4D82-B375-7831D81C29EE}"/>
               </a:ext>
             </a:extLst>
           </p:cNvPr>
@@ -13203,34 +13211,6 @@
       </p:grpSpPr>
       <p:sp>
         <p:nvSpPr>
-          <p:cNvPr id="2" name="Title 1"/>
-          <p:cNvSpPr>
-            <a:spLocks noGrp="1"/>
-          </p:cNvSpPr>
-          <p:nvPr>
-            <p:ph type="title"/>
-          </p:nvPr>
-        </p:nvSpPr>
-        <p:spPr>
-          <a:xfrm>
-            <a:off x="1141412" y="313509"/>
-            <a:ext cx="9905998" cy="1358537"/>
-          </a:xfrm>
-        </p:spPr>
-        <p:txBody>
-          <a:bodyPr/>
-          <a:lstStyle/>
-          <a:p>
-            <a:r>
-              <a:rPr lang="en-US" dirty="0" smtClean="0"/>
-              <a:t>Workflow</a:t>
-            </a:r>
-            <a:endParaRPr lang="en-IN" dirty="0"/>
-          </a:p>
-        </p:txBody>
-      </p:sp>
-      <p:sp>
-        <p:nvSpPr>
           <p:cNvPr id="3" name="Content Placeholder 2"/>
           <p:cNvSpPr>
             <a:spLocks noGrp="1"/>
@@ -13241,8 +13221,8 @@
         </p:nvSpPr>
         <p:spPr>
           <a:xfrm>
-            <a:off x="1141412" y="1550126"/>
-            <a:ext cx="9905999" cy="4807131"/>
+            <a:off x="1211080" y="914400"/>
+            <a:ext cx="9905999" cy="5486401"/>
           </a:xfrm>
         </p:spPr>
         <p:txBody>
@@ -13251,7 +13231,7 @@
           <a:p>
             <a:r>
               <a:rPr lang="en-US" dirty="0" smtClean="0"/>
-              <a:t>Add Products to Cart</a:t>
+              <a:t>View Cart</a:t>
             </a:r>
           </a:p>
           <a:p>
@@ -13273,7 +13253,7 @@
             </a:r>
             <a:r>
               <a:rPr lang="en-US" dirty="0"/>
-              <a:t>user browses the product catalog and selects a product they wish to buy</a:t>
+              <a:t>user can navigate to the Cart Page to review the products they have added</a:t>
             </a:r>
             <a:r>
               <a:rPr lang="en-US" dirty="0" smtClean="0"/>
@@ -13281,6 +13261,21 @@
             </a:r>
           </a:p>
           <a:p>
+            <a:pPr lvl="1"/>
+            <a:r>
+              <a:rPr lang="en-US" dirty="0" smtClean="0"/>
+              <a:t>System </a:t>
+            </a:r>
+            <a:r>
+              <a:rPr lang="en-US" dirty="0"/>
+              <a:t>Action</a:t>
+            </a:r>
+            <a:r>
+              <a:rPr lang="en-US" dirty="0" smtClean="0"/>
+              <a:t>:</a:t>
+            </a:r>
+          </a:p>
+          <a:p>
             <a:pPr lvl="2"/>
             <a:r>
               <a:rPr lang="en-US" dirty="0" smtClean="0"/>
@@ -13288,30 +13283,55 @@
             </a:r>
             <a:r>
               <a:rPr lang="en-US" dirty="0"/>
-              <a:t>user specifies the quantity and clicks the "Add to Cart" button</a:t>
+              <a:t>system retrieves data from the Cart Table for the logged-in user, </a:t>
             </a:r>
             <a:r>
               <a:rPr lang="en-US" dirty="0" smtClean="0"/>
-              <a:t>.</a:t>
-            </a:r>
-          </a:p>
-          <a:p>
-            <a:pPr lvl="1"/>
-            <a:endParaRPr lang="en-US" dirty="0"/>
-          </a:p>
-          <a:p>
-            <a:pPr lvl="1"/>
+              <a:t>showing:</a:t>
+            </a:r>
+          </a:p>
+          <a:p>
+            <a:pPr lvl="3"/>
             <a:r>
               <a:rPr lang="en-US" dirty="0" smtClean="0"/>
-              <a:t>System </a:t>
+              <a:t>Product name</a:t>
+            </a:r>
+          </a:p>
+          <a:p>
+            <a:pPr lvl="3"/>
+            <a:r>
+              <a:rPr lang="en-US" dirty="0" smtClean="0"/>
+              <a:t>Quantity</a:t>
+            </a:r>
+          </a:p>
+          <a:p>
+            <a:pPr lvl="3"/>
+            <a:r>
+              <a:rPr lang="en-US" dirty="0" smtClean="0"/>
+              <a:t>Price </a:t>
             </a:r>
             <a:r>
               <a:rPr lang="en-US" dirty="0"/>
-              <a:t>Action</a:t>
+              <a:t>per </a:t>
             </a:r>
             <a:r>
               <a:rPr lang="en-US" dirty="0" smtClean="0"/>
-              <a:t>:</a:t>
+              <a:t>item</a:t>
+            </a:r>
+          </a:p>
+          <a:p>
+            <a:pPr lvl="3"/>
+            <a:r>
+              <a:rPr lang="en-US" dirty="0" smtClean="0"/>
+              <a:t>Total </a:t>
+            </a:r>
+            <a:r>
+              <a:rPr lang="en-US" dirty="0"/>
+              <a:t>price for each product (calculated as price × quantity</a:t>
+            </a:r>
+            <a:r>
+              <a:rPr lang="en-US" dirty="0" smtClean="0"/>
+              <a:t>).</a:t>
             </a:r>
           </a:p>
           <a:p>
@@ -13322,53 +13342,7 @@
             </a:r>
             <a:r>
               <a:rPr lang="en-US" dirty="0"/>
-              <a:t>system checks the Products Table to validate if sufficient stock is available</a:t>
-            </a:r>
-            <a:r>
-              <a:rPr lang="en-US" dirty="0" smtClean="0"/>
-              <a:t>.</a:t>
-            </a:r>
-          </a:p>
-          <a:p>
-            <a:pPr lvl="2"/>
-            <a:r>
-              <a:rPr lang="en-US" dirty="0" smtClean="0"/>
-              <a:t>The </a:t>
-            </a:r>
-            <a:r>
-              <a:rPr lang="en-US" dirty="0"/>
-              <a:t>product details, including </a:t>
-            </a:r>
-            <a:r>
-              <a:rPr lang="en-US" dirty="0" err="1"/>
-              <a:t>user_id</a:t>
-            </a:r>
-            <a:r>
-              <a:rPr lang="en-US" dirty="0"/>
-              <a:t>, </a:t>
-            </a:r>
-            <a:r>
-              <a:rPr lang="en-US" dirty="0" err="1"/>
-              <a:t>product_id</a:t>
-            </a:r>
-            <a:r>
-              <a:rPr lang="en-US" dirty="0"/>
-              <a:t>, and quantity, are added to the Cart Table</a:t>
-            </a:r>
-            <a:r>
-              <a:rPr lang="en-US" dirty="0" smtClean="0"/>
-              <a:t>.</a:t>
-            </a:r>
-          </a:p>
-          <a:p>
-            <a:pPr lvl="2"/>
-            <a:r>
-              <a:rPr lang="en-US" dirty="0" smtClean="0"/>
-              <a:t>A </a:t>
-            </a:r>
-            <a:r>
-              <a:rPr lang="en-US" dirty="0"/>
-              <a:t>confirmation message is displayed to the user: "Product successfully added to your cart."</a:t>
+              <a:t>grand total price is calculated and displayed dynamically.</a:t>
             </a:r>
             <a:endParaRPr lang="en-IN" dirty="0"/>
           </a:p>
@@ -13377,7 +13351,7 @@
     </p:spTree>
     <p:extLst>
       <p:ext uri="{BB962C8B-B14F-4D97-AF65-F5344CB8AC3E}">
-        <p14:creationId xmlns:p14="http://schemas.microsoft.com/office/powerpoint/2010/main" val="4152413055"/>
+        <p14:creationId xmlns:p14="http://schemas.microsoft.com/office/powerpoint/2010/main" val="2691954107"/>
       </p:ext>
     </p:extLst>
   </p:cSld>
@@ -13423,8 +13397,8 @@
         </p:nvSpPr>
         <p:spPr>
           <a:xfrm>
-            <a:off x="1211080" y="914400"/>
-            <a:ext cx="9905999" cy="5486401"/>
+            <a:off x="1402669" y="653143"/>
+            <a:ext cx="9905999" cy="5556070"/>
           </a:xfrm>
         </p:spPr>
         <p:txBody>
@@ -13432,15 +13406,23 @@
           <a:lstStyle/>
           <a:p>
             <a:r>
+              <a:rPr lang="en-US" dirty="0"/>
+              <a:t>Update </a:t>
+            </a:r>
+            <a:r>
               <a:rPr lang="en-US" dirty="0" smtClean="0"/>
-              <a:t>View Cart</a:t>
+              <a:t>Cart</a:t>
             </a:r>
           </a:p>
           <a:p>
             <a:pPr lvl="1"/>
             <a:r>
+              <a:rPr lang="en-US" dirty="0" smtClean="0"/>
+              <a:t>User </a:t>
+            </a:r>
+            <a:r>
               <a:rPr lang="en-US" dirty="0"/>
-              <a:t>User Action</a:t>
+              <a:t>Action</a:t>
             </a:r>
             <a:r>
               <a:rPr lang="en-US" dirty="0" smtClean="0"/>
@@ -13455,7 +13437,7 @@
             </a:r>
             <a:r>
               <a:rPr lang="en-US" dirty="0"/>
-              <a:t>user can navigate to the Cart Page to review the products they have added</a:t>
+              <a:t>user can increase, decrease, or delete products from their cart</a:t>
             </a:r>
             <a:r>
               <a:rPr lang="en-US" dirty="0" smtClean="0"/>
@@ -13463,14 +13445,14 @@
             </a:r>
           </a:p>
           <a:p>
-            <a:pPr lvl="1"/>
+            <a:pPr lvl="2"/>
             <a:r>
               <a:rPr lang="en-US" dirty="0" smtClean="0"/>
-              <a:t>System </a:t>
+              <a:t>Options </a:t>
             </a:r>
             <a:r>
               <a:rPr lang="en-US" dirty="0"/>
-              <a:t>Action</a:t>
+              <a:t>available</a:t>
             </a:r>
             <a:r>
               <a:rPr lang="en-US" dirty="0" smtClean="0"/>
@@ -13478,58 +13460,14 @@
             </a:r>
           </a:p>
           <a:p>
-            <a:pPr lvl="2"/>
+            <a:pPr lvl="3"/>
             <a:r>
               <a:rPr lang="en-US" dirty="0" smtClean="0"/>
-              <a:t>The </a:t>
+              <a:t>Increase </a:t>
             </a:r>
             <a:r>
               <a:rPr lang="en-US" dirty="0"/>
-              <a:t>system retrieves data from the Cart Table for the logged-in user, </a:t>
-            </a:r>
-            <a:r>
-              <a:rPr lang="en-US" dirty="0" smtClean="0"/>
-              <a:t>showing:</a:t>
-            </a:r>
-          </a:p>
-          <a:p>
-            <a:pPr lvl="3"/>
-            <a:r>
-              <a:rPr lang="en-US" dirty="0" smtClean="0"/>
-              <a:t>Product name</a:t>
-            </a:r>
-          </a:p>
-          <a:p>
-            <a:pPr lvl="3"/>
-            <a:r>
-              <a:rPr lang="en-US" dirty="0" smtClean="0"/>
-              <a:t>Quantity</a:t>
-            </a:r>
-          </a:p>
-          <a:p>
-            <a:pPr lvl="3"/>
-            <a:r>
-              <a:rPr lang="en-US" dirty="0" smtClean="0"/>
-              <a:t>Price </a:t>
-            </a:r>
-            <a:r>
-              <a:rPr lang="en-US" dirty="0"/>
-              <a:t>per </a:t>
-            </a:r>
-            <a:r>
-              <a:rPr lang="en-US" dirty="0" smtClean="0"/>
-              <a:t>item</a:t>
-            </a:r>
-          </a:p>
-          <a:p>
-            <a:pPr lvl="3"/>
-            <a:r>
-              <a:rPr lang="en-US" dirty="0" smtClean="0"/>
-              <a:t>Total </a:t>
-            </a:r>
-            <a:r>
-              <a:rPr lang="en-US" dirty="0"/>
-              <a:t>price for each product (calculated as price × quantity</a:t>
+              <a:t>Quantity: Adjust product count (e.g., from 1 to 2</a:t>
             </a:r>
             <a:r>
               <a:rPr lang="en-US" dirty="0" smtClean="0"/>
@@ -13537,14 +13475,67 @@
             </a:r>
           </a:p>
           <a:p>
+            <a:pPr lvl="3"/>
+            <a:r>
+              <a:rPr lang="en-US" dirty="0" smtClean="0"/>
+              <a:t>Decrease </a:t>
+            </a:r>
+            <a:r>
+              <a:rPr lang="en-US" dirty="0"/>
+              <a:t>Quantity: Reduce product count</a:t>
+            </a:r>
+            <a:r>
+              <a:rPr lang="en-US" dirty="0" smtClean="0"/>
+              <a:t>.</a:t>
+            </a:r>
+          </a:p>
+          <a:p>
+            <a:pPr lvl="3"/>
+            <a:r>
+              <a:rPr lang="en-US" dirty="0" smtClean="0"/>
+              <a:t>Remove Product: Remove a specific product entirely from the cart.</a:t>
+            </a:r>
+          </a:p>
+          <a:p>
+            <a:pPr lvl="1"/>
+            <a:r>
+              <a:rPr lang="en-US" dirty="0" smtClean="0"/>
+              <a:t>System Action:</a:t>
+            </a:r>
+          </a:p>
+          <a:p>
             <a:pPr lvl="2"/>
             <a:r>
               <a:rPr lang="en-US" dirty="0" smtClean="0"/>
-              <a:t>The </a:t>
-            </a:r>
-            <a:r>
-              <a:rPr lang="en-US" dirty="0"/>
-              <a:t>grand total price is calculated and displayed dynamically.</a:t>
+              <a:t>When the user updates the cart:</a:t>
+            </a:r>
+          </a:p>
+          <a:p>
+            <a:pPr lvl="3"/>
+            <a:r>
+              <a:rPr lang="en-US" dirty="0" smtClean="0"/>
+              <a:t>The system validates stock availability for quantity changes.</a:t>
+            </a:r>
+          </a:p>
+          <a:p>
+            <a:pPr lvl="3"/>
+            <a:r>
+              <a:rPr lang="en-US" dirty="0" smtClean="0"/>
+              <a:t>Updates the Cart Table to reflect the new quantity or product removal.</a:t>
+            </a:r>
+          </a:p>
+          <a:p>
+            <a:pPr lvl="3"/>
+            <a:r>
+              <a:rPr lang="en-US" dirty="0" smtClean="0"/>
+              <a:t>Recalculates the total price for each product and the grand total.</a:t>
+            </a:r>
+          </a:p>
+          <a:p>
+            <a:pPr lvl="3"/>
+            <a:r>
+              <a:rPr lang="en-US" dirty="0" smtClean="0"/>
+              <a:t>Displays a confirmation message like "Cart updated successfully."</a:t>
             </a:r>
             <a:endParaRPr lang="en-IN" dirty="0"/>
           </a:p>
@@ -13553,7 +13544,7 @@
     </p:spTree>
     <p:extLst>
       <p:ext uri="{BB962C8B-B14F-4D97-AF65-F5344CB8AC3E}">
-        <p14:creationId xmlns:p14="http://schemas.microsoft.com/office/powerpoint/2010/main" val="2691954107"/>
+        <p14:creationId xmlns:p14="http://schemas.microsoft.com/office/powerpoint/2010/main" val="3173385832"/>
       </p:ext>
     </p:extLst>
   </p:cSld>
@@ -13599,21 +13590,108 @@
         </p:nvSpPr>
         <p:spPr>
           <a:xfrm>
-            <a:off x="1402669" y="653143"/>
-            <a:ext cx="9905999" cy="5556070"/>
+            <a:off x="1141412" y="418011"/>
+            <a:ext cx="9905999" cy="6270172"/>
           </a:xfrm>
         </p:spPr>
         <p:txBody>
-          <a:bodyPr/>
+          <a:bodyPr>
+            <a:normAutofit/>
+          </a:bodyPr>
           <a:lstStyle/>
           <a:p>
             <a:r>
               <a:rPr lang="en-US" dirty="0"/>
-              <a:t>Update </a:t>
+              <a:t>Validate Stock </a:t>
             </a:r>
             <a:r>
               <a:rPr lang="en-US" dirty="0" smtClean="0"/>
-              <a:t>Cart</a:t>
+              <a:t>Availability</a:t>
+            </a:r>
+          </a:p>
+          <a:p>
+            <a:pPr lvl="1"/>
+            <a:r>
+              <a:rPr lang="en-US" dirty="0" smtClean="0"/>
+              <a:t>System </a:t>
+            </a:r>
+            <a:r>
+              <a:rPr lang="en-US" dirty="0"/>
+              <a:t>Action</a:t>
+            </a:r>
+            <a:r>
+              <a:rPr lang="en-US" dirty="0" smtClean="0"/>
+              <a:t>:</a:t>
+            </a:r>
+          </a:p>
+          <a:p>
+            <a:pPr lvl="2"/>
+            <a:r>
+              <a:rPr lang="en-US" dirty="0" smtClean="0"/>
+              <a:t>Before </a:t>
+            </a:r>
+            <a:r>
+              <a:rPr lang="en-US" dirty="0"/>
+              <a:t>checkout, the system checks the Products Table to ensure the stock quantity meets the cart's requirements</a:t>
+            </a:r>
+            <a:r>
+              <a:rPr lang="en-US" dirty="0" smtClean="0"/>
+              <a:t>.</a:t>
+            </a:r>
+          </a:p>
+          <a:p>
+            <a:pPr lvl="2"/>
+            <a:r>
+              <a:rPr lang="en-US" dirty="0" smtClean="0"/>
+              <a:t>If </a:t>
+            </a:r>
+            <a:r>
+              <a:rPr lang="en-US" dirty="0"/>
+              <a:t>stock is insufficient</a:t>
+            </a:r>
+            <a:r>
+              <a:rPr lang="en-US" dirty="0" smtClean="0"/>
+              <a:t>:</a:t>
+            </a:r>
+          </a:p>
+          <a:p>
+            <a:pPr lvl="3"/>
+            <a:r>
+              <a:rPr lang="en-US" dirty="0" smtClean="0"/>
+              <a:t>A </a:t>
+            </a:r>
+            <a:r>
+              <a:rPr lang="en-US" dirty="0"/>
+              <a:t>message is shown: "Sorry, the selected quantity exceeds available stock</a:t>
+            </a:r>
+            <a:r>
+              <a:rPr lang="en-US" dirty="0" smtClean="0"/>
+              <a:t>.“</a:t>
+            </a:r>
+          </a:p>
+          <a:p>
+            <a:pPr lvl="3"/>
+            <a:r>
+              <a:rPr lang="en-US" dirty="0" smtClean="0"/>
+              <a:t>The </a:t>
+            </a:r>
+            <a:r>
+              <a:rPr lang="en-US" dirty="0"/>
+              <a:t>user must adjust the quantity accordingly</a:t>
+            </a:r>
+            <a:r>
+              <a:rPr lang="en-US" dirty="0" smtClean="0"/>
+              <a:t>.</a:t>
+            </a:r>
+          </a:p>
+          <a:p>
+            <a:r>
+              <a:rPr lang="en-US" dirty="0"/>
+              <a:t>Proceed to </a:t>
+            </a:r>
+            <a:r>
+              <a:rPr lang="en-US" dirty="0" smtClean="0"/>
+              <a:t>Checkout</a:t>
             </a:r>
           </a:p>
           <a:p>
@@ -13635,11 +13713,41 @@
             <a:pPr lvl="2"/>
             <a:r>
               <a:rPr lang="en-US" dirty="0" smtClean="0"/>
+              <a:t>Once </a:t>
+            </a:r>
+            <a:r>
+              <a:rPr lang="en-US" dirty="0"/>
+              <a:t>satisfied with the cart, the user clicks "Proceed to Checkout</a:t>
+            </a:r>
+            <a:r>
+              <a:rPr lang="en-US" dirty="0" smtClean="0"/>
+              <a:t>".</a:t>
+            </a:r>
+          </a:p>
+          <a:p>
+            <a:pPr lvl="1"/>
+            <a:r>
+              <a:rPr lang="en-US" dirty="0" smtClean="0"/>
+              <a:t>System </a:t>
+            </a:r>
+            <a:r>
+              <a:rPr lang="en-US" dirty="0"/>
+              <a:t>Action</a:t>
+            </a:r>
+            <a:r>
+              <a:rPr lang="en-US" dirty="0" smtClean="0"/>
+              <a:t>:</a:t>
+            </a:r>
+          </a:p>
+          <a:p>
+            <a:pPr lvl="2"/>
+            <a:r>
+              <a:rPr lang="en-US" dirty="0" smtClean="0"/>
               <a:t>The </a:t>
             </a:r>
             <a:r>
               <a:rPr lang="en-US" dirty="0"/>
-              <a:t>user can increase, decrease, or delete products from their cart</a:t>
+              <a:t>system prepares order details by summarizing the products, quantities, and total price</a:t>
             </a:r>
             <a:r>
               <a:rPr lang="en-US" dirty="0" smtClean="0"/>
@@ -13650,41 +13758,11 @@
             <a:pPr lvl="2"/>
             <a:r>
               <a:rPr lang="en-US" dirty="0" smtClean="0"/>
-              <a:t>Options </a:t>
+              <a:t>The </a:t>
             </a:r>
             <a:r>
               <a:rPr lang="en-US" dirty="0"/>
-              <a:t>available</a:t>
-            </a:r>
-            <a:r>
-              <a:rPr lang="en-US" dirty="0" smtClean="0"/>
-              <a:t>:</a:t>
-            </a:r>
-          </a:p>
-          <a:p>
-            <a:pPr lvl="3"/>
-            <a:r>
-              <a:rPr lang="en-US" dirty="0" smtClean="0"/>
-              <a:t>Increase </a:t>
-            </a:r>
-            <a:r>
-              <a:rPr lang="en-US" dirty="0"/>
-              <a:t>Quantity: Adjust product count (e.g., from 1 to 2</a:t>
-            </a:r>
-            <a:r>
-              <a:rPr lang="en-US" dirty="0" smtClean="0"/>
-              <a:t>).</a:t>
-            </a:r>
-          </a:p>
-          <a:p>
-            <a:pPr lvl="3"/>
-            <a:r>
-              <a:rPr lang="en-US" dirty="0" smtClean="0"/>
-              <a:t>Decrease </a:t>
-            </a:r>
-            <a:r>
-              <a:rPr lang="en-US" dirty="0"/>
-              <a:t>Quantity: Reduce product count</a:t>
+              <a:t>cart data is temporarily stored to create an order in the Orders Table</a:t>
             </a:r>
             <a:r>
               <a:rPr lang="en-US" dirty="0" smtClean="0"/>
@@ -13692,52 +13770,14 @@
             </a:r>
           </a:p>
           <a:p>
-            <a:pPr lvl="3"/>
+            <a:pPr lvl="2"/>
             <a:r>
               <a:rPr lang="en-US" dirty="0" smtClean="0"/>
-              <a:t>Remove Product: Remove a specific product entirely from the cart.</a:t>
-            </a:r>
-          </a:p>
-          <a:p>
-            <a:pPr lvl="1"/>
-            <a:r>
-              <a:rPr lang="en-US" dirty="0" smtClean="0"/>
-              <a:t>System Action:</a:t>
-            </a:r>
-          </a:p>
-          <a:p>
-            <a:pPr lvl="2"/>
-            <a:r>
-              <a:rPr lang="en-US" dirty="0" smtClean="0"/>
-              <a:t>When the user updates the cart:</a:t>
-            </a:r>
-          </a:p>
-          <a:p>
-            <a:pPr lvl="3"/>
-            <a:r>
-              <a:rPr lang="en-US" dirty="0" smtClean="0"/>
-              <a:t>The system validates stock availability for quantity changes.</a:t>
-            </a:r>
-          </a:p>
-          <a:p>
-            <a:pPr lvl="3"/>
-            <a:r>
-              <a:rPr lang="en-US" dirty="0" smtClean="0"/>
-              <a:t>Updates the Cart Table to reflect the new quantity or product removal.</a:t>
-            </a:r>
-          </a:p>
-          <a:p>
-            <a:pPr lvl="3"/>
-            <a:r>
-              <a:rPr lang="en-US" dirty="0" smtClean="0"/>
-              <a:t>Recalculates the total price for each product and the grand total.</a:t>
-            </a:r>
-          </a:p>
-          <a:p>
-            <a:pPr lvl="3"/>
-            <a:r>
-              <a:rPr lang="en-US" dirty="0" smtClean="0"/>
-              <a:t>Displays a confirmation message like "Cart updated successfully."</a:t>
+              <a:t>The </a:t>
+            </a:r>
+            <a:r>
+              <a:rPr lang="en-US" dirty="0"/>
+              <a:t>system redirects the user to the Payment Page to finalize the purchase.</a:t>
             </a:r>
             <a:endParaRPr lang="en-IN" dirty="0"/>
           </a:p>
@@ -13746,7 +13786,7 @@
     </p:spTree>
     <p:extLst>
       <p:ext uri="{BB962C8B-B14F-4D97-AF65-F5344CB8AC3E}">
-        <p14:creationId xmlns:p14="http://schemas.microsoft.com/office/powerpoint/2010/main" val="3173385832"/>
+        <p14:creationId xmlns:p14="http://schemas.microsoft.com/office/powerpoint/2010/main" val="2155694532"/>
       </p:ext>
     </p:extLst>
   </p:cSld>
@@ -13782,6 +13822,28 @@
       </p:grpSpPr>
       <p:sp>
         <p:nvSpPr>
+          <p:cNvPr id="2" name="Title 1"/>
+          <p:cNvSpPr>
+            <a:spLocks noGrp="1"/>
+          </p:cNvSpPr>
+          <p:nvPr>
+            <p:ph type="title"/>
+          </p:nvPr>
+        </p:nvSpPr>
+        <p:spPr/>
+        <p:txBody>
+          <a:bodyPr/>
+          <a:lstStyle/>
+          <a:p>
+            <a:r>
+              <a:rPr lang="en-IN" dirty="0"/>
+              <a:t>Admin Role</a:t>
+            </a:r>
+          </a:p>
+        </p:txBody>
+      </p:sp>
+      <p:sp>
+        <p:nvSpPr>
           <p:cNvPr id="3" name="Content Placeholder 2"/>
           <p:cNvSpPr>
             <a:spLocks noGrp="1"/>
@@ -13790,51 +13852,33 @@
             <p:ph idx="1"/>
           </p:nvPr>
         </p:nvSpPr>
-        <p:spPr>
-          <a:xfrm>
-            <a:off x="1141412" y="418011"/>
-            <a:ext cx="9905999" cy="6270172"/>
-          </a:xfrm>
-        </p:spPr>
+        <p:spPr/>
         <p:txBody>
-          <a:bodyPr>
-            <a:normAutofit/>
-          </a:bodyPr>
+          <a:bodyPr/>
           <a:lstStyle/>
           <a:p>
             <a:r>
+              <a:rPr lang="en-US" b="1" dirty="0"/>
+              <a:t>Who is the Admin?</a:t>
+            </a:r>
+            <a:r>
               <a:rPr lang="en-US" dirty="0"/>
-              <a:t>Validate Stock </a:t>
-            </a:r>
-            <a:r>
-              <a:rPr lang="en-US" dirty="0" smtClean="0"/>
-              <a:t>Availability</a:t>
-            </a:r>
-          </a:p>
-          <a:p>
-            <a:pPr lvl="1"/>
-            <a:r>
-              <a:rPr lang="en-US" dirty="0" smtClean="0"/>
-              <a:t>System </a:t>
-            </a:r>
-            <a:r>
+              <a:t/>
+            </a:r>
+            <a:br>
               <a:rPr lang="en-US" dirty="0"/>
-              <a:t>Action</a:t>
-            </a:r>
-            <a:r>
-              <a:rPr lang="en-US" dirty="0" smtClean="0"/>
-              <a:t>:</a:t>
-            </a:r>
-          </a:p>
-          <a:p>
-            <a:pPr lvl="2"/>
-            <a:r>
-              <a:rPr lang="en-US" dirty="0" smtClean="0"/>
-              <a:t>Before </a:t>
-            </a:r>
+            </a:br>
             <a:r>
               <a:rPr lang="en-US" dirty="0"/>
-              <a:t>checkout, the system checks the Products Table to ensure the stock quantity meets the cart's requirements</a:t>
+              <a:t>The admin is a </a:t>
+            </a:r>
+            <a:r>
+              <a:rPr lang="en-US" dirty="0" err="1"/>
+              <a:t>superuser</a:t>
+            </a:r>
+            <a:r>
+              <a:rPr lang="en-US" dirty="0"/>
+              <a:t> responsible for managing and overseeing the entire e-commerce platform</a:t>
             </a:r>
             <a:r>
               <a:rPr lang="en-US" dirty="0" smtClean="0"/>
@@ -13842,145 +13886,19 @@
             </a:r>
           </a:p>
           <a:p>
-            <a:pPr lvl="2"/>
-            <a:r>
-              <a:rPr lang="en-US" dirty="0" smtClean="0"/>
-              <a:t>If </a:t>
-            </a:r>
+            <a:r>
+              <a:rPr lang="en-US" b="1" dirty="0"/>
+              <a:t>Primary Objective:</a:t>
+            </a:r>
+            <a:endParaRPr lang="en-US" dirty="0"/>
+          </a:p>
+          <a:p>
             <a:r>
               <a:rPr lang="en-US" dirty="0"/>
-              <a:t>stock is insufficient</a:t>
-            </a:r>
-            <a:r>
-              <a:rPr lang="en-US" dirty="0" smtClean="0"/>
-              <a:t>:</a:t>
-            </a:r>
-          </a:p>
-          <a:p>
-            <a:pPr lvl="3"/>
-            <a:r>
-              <a:rPr lang="en-US" dirty="0" smtClean="0"/>
-              <a:t>A </a:t>
-            </a:r>
-            <a:r>
-              <a:rPr lang="en-US" dirty="0"/>
-              <a:t>message is shown: "Sorry, the selected quantity exceeds available stock</a:t>
-            </a:r>
-            <a:r>
-              <a:rPr lang="en-US" dirty="0" smtClean="0"/>
-              <a:t>.“</a:t>
-            </a:r>
-          </a:p>
-          <a:p>
-            <a:pPr lvl="3"/>
-            <a:r>
-              <a:rPr lang="en-US" dirty="0" smtClean="0"/>
-              <a:t>The </a:t>
-            </a:r>
-            <a:r>
-              <a:rPr lang="en-US" dirty="0"/>
-              <a:t>user must adjust the quantity accordingly</a:t>
-            </a:r>
-            <a:r>
-              <a:rPr lang="en-US" dirty="0" smtClean="0"/>
-              <a:t>.</a:t>
-            </a:r>
-          </a:p>
-          <a:p>
-            <a:r>
-              <a:rPr lang="en-US" dirty="0"/>
-              <a:t>Proceed to </a:t>
-            </a:r>
-            <a:r>
-              <a:rPr lang="en-US" dirty="0" smtClean="0"/>
-              <a:t>Checkout</a:t>
-            </a:r>
-          </a:p>
-          <a:p>
-            <a:pPr lvl="1"/>
-            <a:r>
-              <a:rPr lang="en-US" dirty="0" smtClean="0"/>
-              <a:t>User </a:t>
-            </a:r>
-            <a:r>
-              <a:rPr lang="en-US" dirty="0"/>
-              <a:t>Action</a:t>
-            </a:r>
-            <a:r>
-              <a:rPr lang="en-US" dirty="0" smtClean="0"/>
-              <a:t>:</a:t>
-            </a:r>
-          </a:p>
-          <a:p>
-            <a:pPr lvl="2"/>
-            <a:r>
-              <a:rPr lang="en-US" dirty="0" smtClean="0"/>
-              <a:t>Once </a:t>
-            </a:r>
-            <a:r>
-              <a:rPr lang="en-US" dirty="0"/>
-              <a:t>satisfied with the cart, the user clicks "Proceed to Checkout</a:t>
-            </a:r>
-            <a:r>
-              <a:rPr lang="en-US" dirty="0" smtClean="0"/>
-              <a:t>".</a:t>
-            </a:r>
-          </a:p>
-          <a:p>
-            <a:pPr lvl="1"/>
-            <a:r>
-              <a:rPr lang="en-US" dirty="0" smtClean="0"/>
-              <a:t>System </a:t>
-            </a:r>
-            <a:r>
-              <a:rPr lang="en-US" dirty="0"/>
-              <a:t>Action</a:t>
-            </a:r>
-            <a:r>
-              <a:rPr lang="en-US" dirty="0" smtClean="0"/>
-              <a:t>:</a:t>
-            </a:r>
-          </a:p>
-          <a:p>
-            <a:pPr lvl="2"/>
-            <a:r>
-              <a:rPr lang="en-US" dirty="0" smtClean="0"/>
-              <a:t>The </a:t>
-            </a:r>
-            <a:r>
-              <a:rPr lang="en-US" dirty="0"/>
-              <a:t>system prepares order details by summarizing the products, quantities, and total price</a:t>
-            </a:r>
-            <a:r>
-              <a:rPr lang="en-US" dirty="0" smtClean="0"/>
-              <a:t>.</a:t>
-            </a:r>
-          </a:p>
-          <a:p>
-            <a:pPr lvl="2"/>
-            <a:r>
-              <a:rPr lang="en-US" dirty="0" smtClean="0"/>
-              <a:t>The </a:t>
-            </a:r>
-            <a:r>
-              <a:rPr lang="en-US" dirty="0"/>
-              <a:t>cart data is temporarily stored to create an order in the Orders Table</a:t>
-            </a:r>
-            <a:r>
-              <a:rPr lang="en-US" dirty="0" smtClean="0"/>
-              <a:t>.</a:t>
-            </a:r>
-          </a:p>
-          <a:p>
-            <a:pPr lvl="2"/>
-            <a:r>
-              <a:rPr lang="en-US" dirty="0" smtClean="0"/>
-              <a:t>The </a:t>
-            </a:r>
-            <a:r>
-              <a:rPr lang="en-US" dirty="0"/>
-              <a:t>system redirects the user to the Payment Page to finalize the purchase.</a:t>
-            </a:r>
+              <a:t>Maintain the integrity and functionality of the system.</a:t>
+            </a:r>
+          </a:p>
+          <a:p>
             <a:endParaRPr lang="en-IN" dirty="0"/>
           </a:p>
         </p:txBody>
@@ -13988,20 +13906,355 @@
     </p:spTree>
     <p:extLst>
       <p:ext uri="{BB962C8B-B14F-4D97-AF65-F5344CB8AC3E}">
-        <p14:creationId xmlns:p14="http://schemas.microsoft.com/office/powerpoint/2010/main" val="2155694532"/>
+        <p14:creationId xmlns:p14="http://schemas.microsoft.com/office/powerpoint/2010/main" val="2210565324"/>
       </p:ext>
     </p:extLst>
   </p:cSld>
   <p:clrMapOvr>
     <a:masterClrMapping/>
   </p:clrMapOvr>
-  <p:timing>
-    <p:tnLst>
-      <p:par>
-        <p:cTn id="1" dur="indefinite" restart="never" nodeType="tmRoot"/>
-      </p:par>
-    </p:tnLst>
-  </p:timing>
+</p:sld>
+</file>
+
+<file path=ppt/slides/slide14.xml><?xml version="1.0" encoding="utf-8"?>
+<p:sld xmlns:a="http://schemas.openxmlformats.org/drawingml/2006/main" xmlns:r="http://schemas.openxmlformats.org/officeDocument/2006/relationships" xmlns:p="http://schemas.openxmlformats.org/presentationml/2006/main">
+  <p:cSld>
+    <p:spTree>
+      <p:nvGrpSpPr>
+        <p:cNvPr id="1" name=""/>
+        <p:cNvGrpSpPr/>
+        <p:nvPr/>
+      </p:nvGrpSpPr>
+      <p:grpSpPr>
+        <a:xfrm>
+          <a:off x="0" y="0"/>
+          <a:ext cx="0" cy="0"/>
+          <a:chOff x="0" y="0"/>
+          <a:chExt cx="0" cy="0"/>
+        </a:xfrm>
+      </p:grpSpPr>
+      <p:sp>
+        <p:nvSpPr>
+          <p:cNvPr id="2" name="Title 1"/>
+          <p:cNvSpPr>
+            <a:spLocks noGrp="1"/>
+          </p:cNvSpPr>
+          <p:nvPr>
+            <p:ph type="title"/>
+          </p:nvPr>
+        </p:nvSpPr>
+        <p:spPr/>
+        <p:txBody>
+          <a:bodyPr/>
+          <a:lstStyle/>
+          <a:p>
+            <a:r>
+              <a:rPr lang="en-IN" dirty="0"/>
+              <a:t>Key Responsibilities of Admin</a:t>
+            </a:r>
+          </a:p>
+        </p:txBody>
+      </p:sp>
+      <p:sp>
+        <p:nvSpPr>
+          <p:cNvPr id="3" name="Content Placeholder 2"/>
+          <p:cNvSpPr>
+            <a:spLocks noGrp="1"/>
+          </p:cNvSpPr>
+          <p:nvPr>
+            <p:ph idx="1"/>
+          </p:nvPr>
+        </p:nvSpPr>
+        <p:spPr/>
+        <p:txBody>
+          <a:bodyPr/>
+          <a:lstStyle/>
+          <a:p>
+            <a:r>
+              <a:rPr lang="en-US" b="1" dirty="0"/>
+              <a:t>Product Management</a:t>
+            </a:r>
+            <a:endParaRPr lang="en-US" dirty="0"/>
+          </a:p>
+          <a:p>
+            <a:r>
+              <a:rPr lang="en-US" dirty="0"/>
+              <a:t>Add, update, or delete products in the inventory.</a:t>
+            </a:r>
+          </a:p>
+          <a:p>
+            <a:r>
+              <a:rPr lang="en-US" dirty="0"/>
+              <a:t>Manage product categories and descriptions</a:t>
+            </a:r>
+            <a:r>
+              <a:rPr lang="en-US" dirty="0" smtClean="0"/>
+              <a:t>.</a:t>
+            </a:r>
+            <a:endParaRPr lang="en-US" dirty="0"/>
+          </a:p>
+          <a:p>
+            <a:r>
+              <a:rPr lang="en-US" b="1" dirty="0"/>
+              <a:t>Order Management</a:t>
+            </a:r>
+            <a:endParaRPr lang="en-US" dirty="0"/>
+          </a:p>
+          <a:p>
+            <a:r>
+              <a:rPr lang="en-US" dirty="0"/>
+              <a:t>View all placed orders.</a:t>
+            </a:r>
+          </a:p>
+          <a:p>
+            <a:r>
+              <a:rPr lang="en-US" dirty="0"/>
+              <a:t>Update the status of orders (e.g., pending, shipped, delivered).</a:t>
+            </a:r>
+          </a:p>
+          <a:p>
+            <a:pPr marL="0" indent="0">
+              <a:buNone/>
+            </a:pPr>
+            <a:endParaRPr lang="en-US" dirty="0"/>
+          </a:p>
+        </p:txBody>
+      </p:sp>
+    </p:spTree>
+    <p:extLst>
+      <p:ext uri="{BB962C8B-B14F-4D97-AF65-F5344CB8AC3E}">
+        <p14:creationId xmlns:p14="http://schemas.microsoft.com/office/powerpoint/2010/main" val="112663334"/>
+      </p:ext>
+    </p:extLst>
+  </p:cSld>
+  <p:clrMapOvr>
+    <a:masterClrMapping/>
+  </p:clrMapOvr>
+</p:sld>
+</file>
+
+<file path=ppt/slides/slide15.xml><?xml version="1.0" encoding="utf-8"?>
+<p:sld xmlns:a="http://schemas.openxmlformats.org/drawingml/2006/main" xmlns:r="http://schemas.openxmlformats.org/officeDocument/2006/relationships" xmlns:p="http://schemas.openxmlformats.org/presentationml/2006/main">
+  <p:cSld>
+    <p:spTree>
+      <p:nvGrpSpPr>
+        <p:cNvPr id="1" name=""/>
+        <p:cNvGrpSpPr/>
+        <p:nvPr/>
+      </p:nvGrpSpPr>
+      <p:grpSpPr>
+        <a:xfrm>
+          <a:off x="0" y="0"/>
+          <a:ext cx="0" cy="0"/>
+          <a:chOff x="0" y="0"/>
+          <a:chExt cx="0" cy="0"/>
+        </a:xfrm>
+      </p:grpSpPr>
+      <p:sp>
+        <p:nvSpPr>
+          <p:cNvPr id="3" name="Content Placeholder 2"/>
+          <p:cNvSpPr>
+            <a:spLocks noGrp="1"/>
+          </p:cNvSpPr>
+          <p:nvPr>
+            <p:ph idx="1"/>
+          </p:nvPr>
+        </p:nvSpPr>
+        <p:spPr/>
+        <p:txBody>
+          <a:bodyPr/>
+          <a:lstStyle/>
+          <a:p>
+            <a:r>
+              <a:rPr lang="en-US" b="1" dirty="0"/>
+              <a:t>Inventory Management</a:t>
+            </a:r>
+            <a:endParaRPr lang="en-US" dirty="0"/>
+          </a:p>
+          <a:p>
+            <a:r>
+              <a:rPr lang="en-US" dirty="0"/>
+              <a:t>Monitor stock levels.</a:t>
+            </a:r>
+          </a:p>
+          <a:p>
+            <a:r>
+              <a:rPr lang="en-US" dirty="0"/>
+              <a:t>Update stock quantities for products.</a:t>
+            </a:r>
+          </a:p>
+        </p:txBody>
+      </p:sp>
+    </p:spTree>
+    <p:extLst>
+      <p:ext uri="{BB962C8B-B14F-4D97-AF65-F5344CB8AC3E}">
+        <p14:creationId xmlns:p14="http://schemas.microsoft.com/office/powerpoint/2010/main" val="827907215"/>
+      </p:ext>
+    </p:extLst>
+  </p:cSld>
+  <p:clrMapOvr>
+    <a:masterClrMapping/>
+  </p:clrMapOvr>
+</p:sld>
+</file>
+
+<file path=ppt/slides/slide16.xml><?xml version="1.0" encoding="utf-8"?>
+<p:sld xmlns:a="http://schemas.openxmlformats.org/drawingml/2006/main" xmlns:r="http://schemas.openxmlformats.org/officeDocument/2006/relationships" xmlns:p="http://schemas.openxmlformats.org/presentationml/2006/main">
+  <p:cSld>
+    <p:spTree>
+      <p:nvGrpSpPr>
+        <p:cNvPr id="1" name=""/>
+        <p:cNvGrpSpPr/>
+        <p:nvPr/>
+      </p:nvGrpSpPr>
+      <p:grpSpPr>
+        <a:xfrm>
+          <a:off x="0" y="0"/>
+          <a:ext cx="0" cy="0"/>
+          <a:chOff x="0" y="0"/>
+          <a:chExt cx="0" cy="0"/>
+        </a:xfrm>
+      </p:grpSpPr>
+      <p:sp>
+        <p:nvSpPr>
+          <p:cNvPr id="2" name="Title 1"/>
+          <p:cNvSpPr>
+            <a:spLocks noGrp="1"/>
+          </p:cNvSpPr>
+          <p:nvPr>
+            <p:ph type="title"/>
+          </p:nvPr>
+        </p:nvSpPr>
+        <p:spPr/>
+        <p:txBody>
+          <a:bodyPr/>
+          <a:lstStyle/>
+          <a:p>
+            <a:r>
+              <a:rPr lang="en-US" dirty="0" smtClean="0"/>
+              <a:t>Library used</a:t>
+            </a:r>
+            <a:endParaRPr lang="en-IN" dirty="0"/>
+          </a:p>
+        </p:txBody>
+      </p:sp>
+      <p:sp>
+        <p:nvSpPr>
+          <p:cNvPr id="3" name="Content Placeholder 2"/>
+          <p:cNvSpPr>
+            <a:spLocks noGrp="1"/>
+          </p:cNvSpPr>
+          <p:nvPr>
+            <p:ph idx="1"/>
+          </p:nvPr>
+        </p:nvSpPr>
+        <p:spPr/>
+        <p:txBody>
+          <a:bodyPr/>
+          <a:lstStyle/>
+          <a:p>
+            <a:r>
+              <a:rPr lang="en-US" dirty="0" smtClean="0"/>
+              <a:t>Lombok : </a:t>
+            </a:r>
+          </a:p>
+          <a:p>
+            <a:r>
+              <a:rPr lang="en-US" dirty="0"/>
+              <a:t>Lombok is a popular Java library that helps developers reduce boilerplate code, particularly in object-oriented programming. By using Lombok annotations, you can automatically generate common code elements such as getters, setters, constructors, and more during compilation. This simplifies code maintenance and improves readability.</a:t>
+            </a:r>
+            <a:endParaRPr lang="en-IN" dirty="0"/>
+          </a:p>
+        </p:txBody>
+      </p:sp>
+    </p:spTree>
+    <p:extLst>
+      <p:ext uri="{BB962C8B-B14F-4D97-AF65-F5344CB8AC3E}">
+        <p14:creationId xmlns:p14="http://schemas.microsoft.com/office/powerpoint/2010/main" val="117164752"/>
+      </p:ext>
+    </p:extLst>
+  </p:cSld>
+  <p:clrMapOvr>
+    <a:masterClrMapping/>
+  </p:clrMapOvr>
+</p:sld>
+</file>
+
+<file path=ppt/slides/slide17.xml><?xml version="1.0" encoding="utf-8"?>
+<p:sld xmlns:a="http://schemas.openxmlformats.org/drawingml/2006/main" xmlns:r="http://schemas.openxmlformats.org/officeDocument/2006/relationships" xmlns:p="http://schemas.openxmlformats.org/presentationml/2006/main">
+  <p:cSld>
+    <p:spTree>
+      <p:nvGrpSpPr>
+        <p:cNvPr id="1" name=""/>
+        <p:cNvGrpSpPr/>
+        <p:nvPr/>
+      </p:nvGrpSpPr>
+      <p:grpSpPr>
+        <a:xfrm>
+          <a:off x="0" y="0"/>
+          <a:ext cx="0" cy="0"/>
+          <a:chOff x="0" y="0"/>
+          <a:chExt cx="0" cy="0"/>
+        </a:xfrm>
+      </p:grpSpPr>
+      <p:sp>
+        <p:nvSpPr>
+          <p:cNvPr id="2" name="Title 1"/>
+          <p:cNvSpPr>
+            <a:spLocks noGrp="1"/>
+          </p:cNvSpPr>
+          <p:nvPr>
+            <p:ph type="title"/>
+          </p:nvPr>
+        </p:nvSpPr>
+        <p:spPr/>
+        <p:txBody>
+          <a:bodyPr/>
+          <a:lstStyle/>
+          <a:p>
+            <a:endParaRPr lang="en-IN"/>
+          </a:p>
+        </p:txBody>
+      </p:sp>
+      <p:sp>
+        <p:nvSpPr>
+          <p:cNvPr id="3" name="Content Placeholder 2"/>
+          <p:cNvSpPr>
+            <a:spLocks noGrp="1"/>
+          </p:cNvSpPr>
+          <p:nvPr>
+            <p:ph idx="1"/>
+          </p:nvPr>
+        </p:nvSpPr>
+        <p:spPr/>
+        <p:txBody>
+          <a:bodyPr/>
+          <a:lstStyle/>
+          <a:p>
+            <a:r>
+              <a:rPr lang="en-US" dirty="0" smtClean="0"/>
+              <a:t>Log4j :</a:t>
+            </a:r>
+          </a:p>
+          <a:p>
+            <a:r>
+              <a:rPr lang="en-US" dirty="0"/>
+              <a:t>Log4j (short for "Logging for Java") is a popular, open-source logging framework for Java-based applications. It is part of the Apache Logging Services project and provides developers with the ability to log application messages for debugging, monitoring, and auditing purposes.</a:t>
+            </a:r>
+            <a:endParaRPr lang="en-IN" dirty="0"/>
+          </a:p>
+        </p:txBody>
+      </p:sp>
+    </p:spTree>
+    <p:extLst>
+      <p:ext uri="{BB962C8B-B14F-4D97-AF65-F5344CB8AC3E}">
+        <p14:creationId xmlns:p14="http://schemas.microsoft.com/office/powerpoint/2010/main" val="121886737"/>
+      </p:ext>
+    </p:extLst>
+  </p:cSld>
+  <p:clrMapOvr>
+    <a:masterClrMapping/>
+  </p:clrMapOvr>
 </p:sld>
 </file>
 
@@ -14027,7 +14280,7 @@
           <p:cNvPr id="2" name="Title 1">
             <a:extLst>
               <a:ext uri="{FF2B5EF4-FFF2-40B4-BE49-F238E27FC236}">
-                <a16:creationId xmlns="" xmlns:a16="http://schemas.microsoft.com/office/drawing/2014/main" id="{34DB6CE4-2B13-4715-B5B2-615A55922CA1}"/>
+                <a16:creationId xmlns:a16="http://schemas.microsoft.com/office/drawing/2014/main" xmlns="" id="{34DB6CE4-2B13-4715-B5B2-615A55922CA1}"/>
               </a:ext>
             </a:extLst>
           </p:cNvPr>
@@ -14470,127 +14723,6 @@
       </p:grpSpPr>
       <p:sp>
         <p:nvSpPr>
-          <p:cNvPr id="2" name="Title 1"/>
-          <p:cNvSpPr>
-            <a:spLocks noGrp="1"/>
-          </p:cNvSpPr>
-          <p:nvPr>
-            <p:ph type="title"/>
-          </p:nvPr>
-        </p:nvSpPr>
-        <p:spPr>
-          <a:xfrm>
-            <a:off x="1141412" y="348343"/>
-            <a:ext cx="8931228" cy="799510"/>
-          </a:xfrm>
-        </p:spPr>
-        <p:txBody>
-          <a:bodyPr/>
-          <a:lstStyle/>
-          <a:p>
-            <a:r>
-              <a:rPr lang="en-US" dirty="0" smtClean="0"/>
-              <a:t>Database</a:t>
-            </a:r>
-            <a:endParaRPr lang="en-IN" dirty="0"/>
-          </a:p>
-        </p:txBody>
-      </p:sp>
-      <p:sp>
-        <p:nvSpPr>
-          <p:cNvPr id="3" name="Content Placeholder 2"/>
-          <p:cNvSpPr>
-            <a:spLocks noGrp="1"/>
-          </p:cNvSpPr>
-          <p:nvPr>
-            <p:ph idx="1"/>
-          </p:nvPr>
-        </p:nvSpPr>
-        <p:spPr>
-          <a:xfrm>
-            <a:off x="1141412" y="1343795"/>
-            <a:ext cx="9905999" cy="3541714"/>
-          </a:xfrm>
-        </p:spPr>
-        <p:txBody>
-          <a:bodyPr/>
-          <a:lstStyle/>
-          <a:p>
-            <a:r>
-              <a:rPr lang="en-US" dirty="0" smtClean="0"/>
-              <a:t>Database Schema</a:t>
-            </a:r>
-          </a:p>
-          <a:p>
-            <a:pPr marL="0" indent="0">
-              <a:buNone/>
-            </a:pPr>
-            <a:endParaRPr lang="en-IN" dirty="0"/>
-          </a:p>
-        </p:txBody>
-      </p:sp>
-      <p:pic>
-        <p:nvPicPr>
-          <p:cNvPr id="4" name="Picture 3"/>
-          <p:cNvPicPr>
-            <a:picLocks noChangeAspect="1"/>
-          </p:cNvPicPr>
-          <p:nvPr/>
-        </p:nvPicPr>
-        <p:blipFill>
-          <a:blip r:embed="rId2">
-            <a:extLst>
-              <a:ext uri="{28A0092B-C50C-407E-A947-70E740481C1C}">
-                <a14:useLocalDpi xmlns:a14="http://schemas.microsoft.com/office/drawing/2010/main" val="0"/>
-              </a:ext>
-            </a:extLst>
-          </a:blip>
-          <a:stretch>
-            <a:fillRect/>
-          </a:stretch>
-        </p:blipFill>
-        <p:spPr>
-          <a:xfrm>
-            <a:off x="1228498" y="2046780"/>
-            <a:ext cx="9095143" cy="4380146"/>
-          </a:xfrm>
-          <a:prstGeom prst="rect">
-            <a:avLst/>
-          </a:prstGeom>
-        </p:spPr>
-      </p:pic>
-    </p:spTree>
-    <p:extLst>
-      <p:ext uri="{BB962C8B-B14F-4D97-AF65-F5344CB8AC3E}">
-        <p14:creationId xmlns:p14="http://schemas.microsoft.com/office/powerpoint/2010/main" val="2474873293"/>
-      </p:ext>
-    </p:extLst>
-  </p:cSld>
-  <p:clrMapOvr>
-    <a:masterClrMapping/>
-  </p:clrMapOvr>
-</p:sld>
-</file>
-
-<file path=ppt/slides/slide5.xml><?xml version="1.0" encoding="utf-8"?>
-<p:sld xmlns:a="http://schemas.openxmlformats.org/drawingml/2006/main" xmlns:r="http://schemas.openxmlformats.org/officeDocument/2006/relationships" xmlns:p="http://schemas.openxmlformats.org/presentationml/2006/main">
-  <p:cSld>
-    <p:spTree>
-      <p:nvGrpSpPr>
-        <p:cNvPr id="1" name=""/>
-        <p:cNvGrpSpPr/>
-        <p:nvPr/>
-      </p:nvGrpSpPr>
-      <p:grpSpPr>
-        <a:xfrm>
-          <a:off x="0" y="0"/>
-          <a:ext cx="0" cy="0"/>
-          <a:chOff x="0" y="0"/>
-          <a:chExt cx="0" cy="0"/>
-        </a:xfrm>
-      </p:grpSpPr>
-      <p:sp>
-        <p:nvSpPr>
           <p:cNvPr id="3" name="Content Placeholder 2"/>
           <p:cNvSpPr>
             <a:spLocks noGrp="1"/>
@@ -14652,6 +14784,34 @@
           </a:prstGeom>
         </p:spPr>
       </p:pic>
+      <p:sp>
+        <p:nvSpPr>
+          <p:cNvPr id="5" name="Title 1"/>
+          <p:cNvSpPr>
+            <a:spLocks noGrp="1"/>
+          </p:cNvSpPr>
+          <p:nvPr>
+            <p:ph type="title"/>
+          </p:nvPr>
+        </p:nvSpPr>
+        <p:spPr>
+          <a:xfrm>
+            <a:off x="1016550" y="184441"/>
+            <a:ext cx="8931228" cy="799510"/>
+          </a:xfrm>
+        </p:spPr>
+        <p:txBody>
+          <a:bodyPr/>
+          <a:lstStyle/>
+          <a:p>
+            <a:r>
+              <a:rPr lang="en-US" smtClean="0"/>
+              <a:t>Database</a:t>
+            </a:r>
+            <a:endParaRPr lang="en-IN" dirty="0"/>
+          </a:p>
+        </p:txBody>
+      </p:sp>
     </p:spTree>
     <p:extLst>
       <p:ext uri="{BB962C8B-B14F-4D97-AF65-F5344CB8AC3E}">
@@ -14672,7 +14832,7 @@
 </p:sld>
 </file>
 
-<file path=ppt/slides/slide6.xml><?xml version="1.0" encoding="utf-8"?>
+<file path=ppt/slides/slide5.xml><?xml version="1.0" encoding="utf-8"?>
 <p:sld xmlns:a="http://schemas.openxmlformats.org/drawingml/2006/main" xmlns:r="http://schemas.openxmlformats.org/officeDocument/2006/relationships" xmlns:p="http://schemas.openxmlformats.org/presentationml/2006/main">
   <p:cSld>
     <p:spTree>
@@ -14769,7 +14929,7 @@
 </p:sld>
 </file>
 
-<file path=ppt/slides/slide7.xml><?xml version="1.0" encoding="utf-8"?>
+<file path=ppt/slides/slide6.xml><?xml version="1.0" encoding="utf-8"?>
 <p:sld xmlns:a="http://schemas.openxmlformats.org/drawingml/2006/main" xmlns:r="http://schemas.openxmlformats.org/officeDocument/2006/relationships" xmlns:p="http://schemas.openxmlformats.org/presentationml/2006/main">
   <p:cSld>
     <p:spTree>
@@ -14866,7 +15026,7 @@
 </p:sld>
 </file>
 
-<file path=ppt/slides/slide8.xml><?xml version="1.0" encoding="utf-8"?>
+<file path=ppt/slides/slide7.xml><?xml version="1.0" encoding="utf-8"?>
 <p:sld xmlns:a="http://schemas.openxmlformats.org/drawingml/2006/main" xmlns:r="http://schemas.openxmlformats.org/officeDocument/2006/relationships" xmlns:p="http://schemas.openxmlformats.org/presentationml/2006/main">
   <p:cSld>
     <p:spTree>
@@ -14933,7 +15093,7 @@
 </p:sld>
 </file>
 
-<file path=ppt/slides/slide9.xml><?xml version="1.0" encoding="utf-8"?>
+<file path=ppt/slides/slide8.xml><?xml version="1.0" encoding="utf-8"?>
 <p:sld xmlns:a="http://schemas.openxmlformats.org/drawingml/2006/main" xmlns:r="http://schemas.openxmlformats.org/officeDocument/2006/relationships" xmlns:p="http://schemas.openxmlformats.org/presentationml/2006/main">
   <p:cSld>
     <p:spTree>
@@ -15012,6 +15172,216 @@
     <p:extLst>
       <p:ext uri="{BB962C8B-B14F-4D97-AF65-F5344CB8AC3E}">
         <p14:creationId xmlns:p14="http://schemas.microsoft.com/office/powerpoint/2010/main" val="516579356"/>
+      </p:ext>
+    </p:extLst>
+  </p:cSld>
+  <p:clrMapOvr>
+    <a:masterClrMapping/>
+  </p:clrMapOvr>
+  <p:timing>
+    <p:tnLst>
+      <p:par>
+        <p:cTn id="1" dur="indefinite" restart="never" nodeType="tmRoot"/>
+      </p:par>
+    </p:tnLst>
+  </p:timing>
+</p:sld>
+</file>
+
+<file path=ppt/slides/slide9.xml><?xml version="1.0" encoding="utf-8"?>
+<p:sld xmlns:a="http://schemas.openxmlformats.org/drawingml/2006/main" xmlns:r="http://schemas.openxmlformats.org/officeDocument/2006/relationships" xmlns:p="http://schemas.openxmlformats.org/presentationml/2006/main">
+  <p:cSld>
+    <p:spTree>
+      <p:nvGrpSpPr>
+        <p:cNvPr id="1" name=""/>
+        <p:cNvGrpSpPr/>
+        <p:nvPr/>
+      </p:nvGrpSpPr>
+      <p:grpSpPr>
+        <a:xfrm>
+          <a:off x="0" y="0"/>
+          <a:ext cx="0" cy="0"/>
+          <a:chOff x="0" y="0"/>
+          <a:chExt cx="0" cy="0"/>
+        </a:xfrm>
+      </p:grpSpPr>
+      <p:sp>
+        <p:nvSpPr>
+          <p:cNvPr id="2" name="Title 1"/>
+          <p:cNvSpPr>
+            <a:spLocks noGrp="1"/>
+          </p:cNvSpPr>
+          <p:nvPr>
+            <p:ph type="title"/>
+          </p:nvPr>
+        </p:nvSpPr>
+        <p:spPr>
+          <a:xfrm>
+            <a:off x="1141412" y="313509"/>
+            <a:ext cx="9905998" cy="1358537"/>
+          </a:xfrm>
+        </p:spPr>
+        <p:txBody>
+          <a:bodyPr/>
+          <a:lstStyle/>
+          <a:p>
+            <a:r>
+              <a:rPr lang="en-US" dirty="0" smtClean="0"/>
+              <a:t>Workflow</a:t>
+            </a:r>
+            <a:endParaRPr lang="en-IN" dirty="0"/>
+          </a:p>
+        </p:txBody>
+      </p:sp>
+      <p:sp>
+        <p:nvSpPr>
+          <p:cNvPr id="3" name="Content Placeholder 2"/>
+          <p:cNvSpPr>
+            <a:spLocks noGrp="1"/>
+          </p:cNvSpPr>
+          <p:nvPr>
+            <p:ph idx="1"/>
+          </p:nvPr>
+        </p:nvSpPr>
+        <p:spPr>
+          <a:xfrm>
+            <a:off x="1141412" y="1550126"/>
+            <a:ext cx="9905999" cy="4807131"/>
+          </a:xfrm>
+        </p:spPr>
+        <p:txBody>
+          <a:bodyPr/>
+          <a:lstStyle/>
+          <a:p>
+            <a:r>
+              <a:rPr lang="en-US" dirty="0" smtClean="0"/>
+              <a:t>Add Products to Cart</a:t>
+            </a:r>
+          </a:p>
+          <a:p>
+            <a:pPr lvl="1"/>
+            <a:r>
+              <a:rPr lang="en-US" dirty="0"/>
+              <a:t>User Action</a:t>
+            </a:r>
+            <a:r>
+              <a:rPr lang="en-US" dirty="0" smtClean="0"/>
+              <a:t>:</a:t>
+            </a:r>
+          </a:p>
+          <a:p>
+            <a:pPr lvl="2"/>
+            <a:r>
+              <a:rPr lang="en-US" dirty="0" smtClean="0"/>
+              <a:t>The </a:t>
+            </a:r>
+            <a:r>
+              <a:rPr lang="en-US" dirty="0"/>
+              <a:t>user browses the product catalog and selects a product they wish to buy</a:t>
+            </a:r>
+            <a:r>
+              <a:rPr lang="en-US" dirty="0" smtClean="0"/>
+              <a:t>.</a:t>
+            </a:r>
+          </a:p>
+          <a:p>
+            <a:pPr lvl="2"/>
+            <a:r>
+              <a:rPr lang="en-US" dirty="0" smtClean="0"/>
+              <a:t>The </a:t>
+            </a:r>
+            <a:r>
+              <a:rPr lang="en-US" dirty="0"/>
+              <a:t>user specifies the quantity and clicks the "Add to Cart" button</a:t>
+            </a:r>
+            <a:r>
+              <a:rPr lang="en-US" dirty="0" smtClean="0"/>
+              <a:t>.</a:t>
+            </a:r>
+          </a:p>
+          <a:p>
+            <a:pPr lvl="1"/>
+            <a:endParaRPr lang="en-US" dirty="0"/>
+          </a:p>
+          <a:p>
+            <a:pPr lvl="1"/>
+            <a:r>
+              <a:rPr lang="en-US" dirty="0" smtClean="0"/>
+              <a:t>System </a:t>
+            </a:r>
+            <a:r>
+              <a:rPr lang="en-US" dirty="0"/>
+              <a:t>Action</a:t>
+            </a:r>
+            <a:r>
+              <a:rPr lang="en-US" dirty="0" smtClean="0"/>
+              <a:t>:</a:t>
+            </a:r>
+          </a:p>
+          <a:p>
+            <a:pPr lvl="2"/>
+            <a:r>
+              <a:rPr lang="en-US" dirty="0" smtClean="0"/>
+              <a:t>The </a:t>
+            </a:r>
+            <a:r>
+              <a:rPr lang="en-US" dirty="0"/>
+              <a:t>system checks the Products Table to validate if sufficient stock is available</a:t>
+            </a:r>
+            <a:r>
+              <a:rPr lang="en-US" dirty="0" smtClean="0"/>
+              <a:t>.</a:t>
+            </a:r>
+          </a:p>
+          <a:p>
+            <a:pPr lvl="2"/>
+            <a:r>
+              <a:rPr lang="en-US" dirty="0" smtClean="0"/>
+              <a:t>The </a:t>
+            </a:r>
+            <a:r>
+              <a:rPr lang="en-US" dirty="0"/>
+              <a:t>product details, including </a:t>
+            </a:r>
+            <a:r>
+              <a:rPr lang="en-US" dirty="0" err="1"/>
+              <a:t>user_id</a:t>
+            </a:r>
+            <a:r>
+              <a:rPr lang="en-US" dirty="0"/>
+              <a:t>, </a:t>
+            </a:r>
+            <a:r>
+              <a:rPr lang="en-US" dirty="0" err="1"/>
+              <a:t>product_id</a:t>
+            </a:r>
+            <a:r>
+              <a:rPr lang="en-US" dirty="0"/>
+              <a:t>, and quantity, are added to the Cart Table</a:t>
+            </a:r>
+            <a:r>
+              <a:rPr lang="en-US" dirty="0" smtClean="0"/>
+              <a:t>.</a:t>
+            </a:r>
+          </a:p>
+          <a:p>
+            <a:pPr lvl="2"/>
+            <a:r>
+              <a:rPr lang="en-US" dirty="0" smtClean="0"/>
+              <a:t>A </a:t>
+            </a:r>
+            <a:r>
+              <a:rPr lang="en-US" dirty="0"/>
+              <a:t>confirmation message is displayed to the user: "Product successfully added to your cart."</a:t>
+            </a:r>
+            <a:endParaRPr lang="en-IN" dirty="0"/>
+          </a:p>
+        </p:txBody>
+      </p:sp>
+    </p:spTree>
+    <p:extLst>
+      <p:ext uri="{BB962C8B-B14F-4D97-AF65-F5344CB8AC3E}">
+        <p14:creationId xmlns:p14="http://schemas.microsoft.com/office/powerpoint/2010/main" val="4152413055"/>
       </p:ext>
     </p:extLst>
   </p:cSld>
@@ -15879,14 +16249,6 @@
 </file>
 
 <file path=customXml/item2.xml><?xml version="1.0" encoding="utf-8"?>
-<p:properties xmlns:p="http://schemas.microsoft.com/office/2006/metadata/properties" xmlns:xsi="http://www.w3.org/2001/XMLSchema-instance" xmlns:pc="http://schemas.microsoft.com/office/infopath/2007/PartnerControls">
-  <documentManagement>
-    <MediaServiceKeyPoints xmlns="71af3243-3dd4-4a8d-8c0d-dd76da1f02a5" xsi:nil="true"/>
-  </documentManagement>
-</p:properties>
-</file>
-
-<file path=customXml/item3.xml><?xml version="1.0" encoding="utf-8"?>
 <ct:contentTypeSchema xmlns:ct="http://schemas.microsoft.com/office/2006/metadata/contentType" xmlns:ma="http://schemas.microsoft.com/office/2006/metadata/properties/metaAttributes" ct:_="" ma:_="" ma:contentTypeName="Document" ma:contentTypeID="0x01010079F111ED35F8CC479449609E8A0923A6" ma:contentTypeVersion="11" ma:contentTypeDescription="Create a new document." ma:contentTypeScope="" ma:versionID="96291512c1ee715ab617f4c07df79fc1">
   <xsd:schema xmlns:xsd="http://www.w3.org/2001/XMLSchema" xmlns:xs="http://www.w3.org/2001/XMLSchema" xmlns:p="http://schemas.microsoft.com/office/2006/metadata/properties" xmlns:ns2="71af3243-3dd4-4a8d-8c0d-dd76da1f02a5" xmlns:ns3="16c05727-aa75-4e4a-9b5f-8a80a1165891" targetNamespace="http://schemas.microsoft.com/office/2006/metadata/properties" ma:root="true" ma:fieldsID="8256c27c40ca5c40ce1cf6c44f0205df" ns2:_="" ns3:_="">
     <xsd:import namespace="71af3243-3dd4-4a8d-8c0d-dd76da1f02a5"/>
@@ -16097,6 +16459,14 @@
 </ct:contentTypeSchema>
 </file>
 
+<file path=customXml/item3.xml><?xml version="1.0" encoding="utf-8"?>
+<p:properties xmlns:p="http://schemas.microsoft.com/office/2006/metadata/properties" xmlns:xsi="http://www.w3.org/2001/XMLSchema-instance" xmlns:pc="http://schemas.microsoft.com/office/infopath/2007/PartnerControls">
+  <documentManagement>
+    <MediaServiceKeyPoints xmlns="71af3243-3dd4-4a8d-8c0d-dd76da1f02a5" xsi:nil="true"/>
+  </documentManagement>
+</p:properties>
+</file>
+
 <file path=customXml/itemProps1.xml><?xml version="1.0" encoding="utf-8"?>
 <ds:datastoreItem xmlns:ds="http://schemas.openxmlformats.org/officeDocument/2006/customXml" ds:itemID="{B579702B-25C7-40D7-9E29-7686B11A9660}">
   <ds:schemaRefs>
@@ -16106,16 +16476,6 @@
 </file>
 
 <file path=customXml/itemProps2.xml><?xml version="1.0" encoding="utf-8"?>
-<ds:datastoreItem xmlns:ds="http://schemas.openxmlformats.org/officeDocument/2006/customXml" ds:itemID="{E7866CFD-F94E-4AE5-ACEA-86FEC0F48A10}">
-  <ds:schemaRefs>
-    <ds:schemaRef ds:uri="http://schemas.microsoft.com/office/2006/metadata/properties"/>
-    <ds:schemaRef ds:uri="http://schemas.microsoft.com/office/infopath/2007/PartnerControls"/>
-    <ds:schemaRef ds:uri="71af3243-3dd4-4a8d-8c0d-dd76da1f02a5"/>
-  </ds:schemaRefs>
-</ds:datastoreItem>
-</file>
-
-<file path=customXml/itemProps3.xml><?xml version="1.0" encoding="utf-8"?>
 <ds:datastoreItem xmlns:ds="http://schemas.openxmlformats.org/officeDocument/2006/customXml" ds:itemID="{A7C0B241-13E5-418D-8920-D23491E2D2C0}">
   <ds:schemaRefs>
     <ds:schemaRef ds:uri="http://schemas.microsoft.com/office/2006/metadata/contentType"/>
@@ -16132,4 +16492,14 @@
     <ds:schemaRef ds:uri="http://schemas.microsoft.com/internal/obd"/>
   </ds:schemaRefs>
 </ds:datastoreItem>
+</file>
+
+<file path=customXml/itemProps3.xml><?xml version="1.0" encoding="utf-8"?>
+<ds:datastoreItem xmlns:ds="http://schemas.openxmlformats.org/officeDocument/2006/customXml" ds:itemID="{E7866CFD-F94E-4AE5-ACEA-86FEC0F48A10}">
+  <ds:schemaRefs>
+    <ds:schemaRef ds:uri="http://schemas.microsoft.com/office/2006/metadata/properties"/>
+    <ds:schemaRef ds:uri="http://schemas.microsoft.com/office/infopath/2007/PartnerControls"/>
+    <ds:schemaRef ds:uri="71af3243-3dd4-4a8d-8c0d-dd76da1f02a5"/>
+  </ds:schemaRefs>
+</ds:datastoreItem>
 </file>
</xml_diff>